<commit_message>
V2 of the compliance engine to support CI/CD + others
</commit_message>
<xml_diff>
--- a/docs/images/AWS High-Level design for Compliance-as-code framework.pptx
+++ b/docs/images/AWS High-Level design for Compliance-as-code framework.pptx
@@ -5,7 +5,8 @@
     <p:sldMasterId id="2147483660" r:id="rId1"/>
   </p:sldMasterIdLst>
   <p:sldIdLst>
-    <p:sldId id="257" r:id="rId2"/>
+    <p:sldId id="258" r:id="rId2"/>
+    <p:sldId id="257" r:id="rId3"/>
   </p:sldIdLst>
   <p:sldSz cx="12192000" cy="11430000"/>
   <p:notesSz cx="6858000" cy="9144000"/>
@@ -243,7 +244,7 @@
           <a:p>
             <a:fld id="{5B14C63E-25B4-1A4A-A2D3-4AF27F79BADA}" type="datetimeFigureOut">
               <a:rPr lang="en-US" smtClean="0"/>
-              <a:t>3/17/2018</a:t>
+              <a:t>8/18/2018</a:t>
             </a:fld>
             <a:endParaRPr lang="en-US"/>
           </a:p>
@@ -413,7 +414,7 @@
           <a:p>
             <a:fld id="{5B14C63E-25B4-1A4A-A2D3-4AF27F79BADA}" type="datetimeFigureOut">
               <a:rPr lang="en-US" smtClean="0"/>
-              <a:t>3/17/2018</a:t>
+              <a:t>8/18/2018</a:t>
             </a:fld>
             <a:endParaRPr lang="en-US"/>
           </a:p>
@@ -593,7 +594,7 @@
           <a:p>
             <a:fld id="{5B14C63E-25B4-1A4A-A2D3-4AF27F79BADA}" type="datetimeFigureOut">
               <a:rPr lang="en-US" smtClean="0"/>
-              <a:t>3/17/2018</a:t>
+              <a:t>8/18/2018</a:t>
             </a:fld>
             <a:endParaRPr lang="en-US"/>
           </a:p>
@@ -763,7 +764,7 @@
           <a:p>
             <a:fld id="{5B14C63E-25B4-1A4A-A2D3-4AF27F79BADA}" type="datetimeFigureOut">
               <a:rPr lang="en-US" smtClean="0"/>
-              <a:t>3/17/2018</a:t>
+              <a:t>8/18/2018</a:t>
             </a:fld>
             <a:endParaRPr lang="en-US"/>
           </a:p>
@@ -1007,7 +1008,7 @@
           <a:p>
             <a:fld id="{5B14C63E-25B4-1A4A-A2D3-4AF27F79BADA}" type="datetimeFigureOut">
               <a:rPr lang="en-US" smtClean="0"/>
-              <a:t>3/17/2018</a:t>
+              <a:t>8/18/2018</a:t>
             </a:fld>
             <a:endParaRPr lang="en-US"/>
           </a:p>
@@ -1239,7 +1240,7 @@
           <a:p>
             <a:fld id="{5B14C63E-25B4-1A4A-A2D3-4AF27F79BADA}" type="datetimeFigureOut">
               <a:rPr lang="en-US" smtClean="0"/>
-              <a:t>3/17/2018</a:t>
+              <a:t>8/18/2018</a:t>
             </a:fld>
             <a:endParaRPr lang="en-US"/>
           </a:p>
@@ -1606,7 +1607,7 @@
           <a:p>
             <a:fld id="{5B14C63E-25B4-1A4A-A2D3-4AF27F79BADA}" type="datetimeFigureOut">
               <a:rPr lang="en-US" smtClean="0"/>
-              <a:t>3/17/2018</a:t>
+              <a:t>8/18/2018</a:t>
             </a:fld>
             <a:endParaRPr lang="en-US"/>
           </a:p>
@@ -1724,7 +1725,7 @@
           <a:p>
             <a:fld id="{5B14C63E-25B4-1A4A-A2D3-4AF27F79BADA}" type="datetimeFigureOut">
               <a:rPr lang="en-US" smtClean="0"/>
-              <a:t>3/17/2018</a:t>
+              <a:t>8/18/2018</a:t>
             </a:fld>
             <a:endParaRPr lang="en-US"/>
           </a:p>
@@ -1819,7 +1820,7 @@
           <a:p>
             <a:fld id="{5B14C63E-25B4-1A4A-A2D3-4AF27F79BADA}" type="datetimeFigureOut">
               <a:rPr lang="en-US" smtClean="0"/>
-              <a:t>3/17/2018</a:t>
+              <a:t>8/18/2018</a:t>
             </a:fld>
             <a:endParaRPr lang="en-US"/>
           </a:p>
@@ -2096,7 +2097,7 @@
           <a:p>
             <a:fld id="{5B14C63E-25B4-1A4A-A2D3-4AF27F79BADA}" type="datetimeFigureOut">
               <a:rPr lang="en-US" smtClean="0"/>
-              <a:t>3/17/2018</a:t>
+              <a:t>8/18/2018</a:t>
             </a:fld>
             <a:endParaRPr lang="en-US"/>
           </a:p>
@@ -2353,7 +2354,7 @@
           <a:p>
             <a:fld id="{5B14C63E-25B4-1A4A-A2D3-4AF27F79BADA}" type="datetimeFigureOut">
               <a:rPr lang="en-US" smtClean="0"/>
-              <a:t>3/17/2018</a:t>
+              <a:t>8/18/2018</a:t>
             </a:fld>
             <a:endParaRPr lang="en-US"/>
           </a:p>
@@ -2566,7 +2567,7 @@
           <a:p>
             <a:fld id="{5B14C63E-25B4-1A4A-A2D3-4AF27F79BADA}" type="datetimeFigureOut">
               <a:rPr lang="en-US" smtClean="0"/>
-              <a:t>3/17/2018</a:t>
+              <a:t>8/18/2018</a:t>
             </a:fld>
             <a:endParaRPr lang="en-US"/>
           </a:p>
@@ -2979,8 +2980,8 @@
         </p:nvSpPr>
         <p:spPr>
           <a:xfrm>
-            <a:off x="782838" y="812742"/>
-            <a:ext cx="4279356" cy="5509475"/>
+            <a:off x="1087454" y="1130226"/>
+            <a:ext cx="4808380" cy="7631809"/>
           </a:xfrm>
           <a:prstGeom prst="roundRect">
             <a:avLst>
@@ -3037,8 +3038,8 @@
         </p:nvSpPr>
         <p:spPr bwMode="auto">
           <a:xfrm>
-            <a:off x="2248434" y="553341"/>
-            <a:ext cx="1837458" cy="261610"/>
+            <a:off x="2126668" y="870824"/>
+            <a:ext cx="2690222" cy="261610"/>
           </a:xfrm>
           <a:prstGeom prst="rect">
             <a:avLst/>
@@ -3068,7 +3069,7 @@
           </a:lstStyle>
           <a:p>
             <a:r>
-              <a:rPr lang="en-US" dirty="0"/>
+              <a:rPr lang="en-US" sz="2000" dirty="0"/>
               <a:t>Compliance Account</a:t>
             </a:r>
           </a:p>
@@ -3096,7 +3097,7 @@
         </p:blipFill>
         <p:spPr>
           <a:xfrm>
-            <a:off x="936167" y="545703"/>
+            <a:off x="1240783" y="863186"/>
             <a:ext cx="603504" cy="393954"/>
           </a:xfrm>
           <a:prstGeom prst="rect">
@@ -3112,8 +3113,8 @@
         </p:nvSpPr>
         <p:spPr>
           <a:xfrm>
-            <a:off x="5535313" y="812741"/>
-            <a:ext cx="5370170" cy="4547792"/>
+            <a:off x="6788478" y="1130224"/>
+            <a:ext cx="4350367" cy="1956942"/>
           </a:xfrm>
           <a:prstGeom prst="roundRect">
             <a:avLst>
@@ -3170,7 +3171,7 @@
         </p:nvSpPr>
         <p:spPr bwMode="auto">
           <a:xfrm>
-            <a:off x="6925599" y="552949"/>
+            <a:off x="7762492" y="870432"/>
             <a:ext cx="2778790" cy="261610"/>
           </a:xfrm>
           <a:prstGeom prst="rect">
@@ -3201,9 +3202,14 @@
           </a:lstStyle>
           <a:p>
             <a:r>
-              <a:rPr lang="en-US" sz="1400" b="1" dirty="0"/>
-              <a:t>Application Account(s)</a:t>
-            </a:r>
+              <a:rPr lang="en-US" sz="1800" b="1" dirty="0"/>
+              <a:t>Application </a:t>
+            </a:r>
+            <a:r>
+              <a:rPr lang="en-US" sz="1800" b="1" dirty="0" smtClean="0"/>
+              <a:t>Account 1</a:t>
+            </a:r>
+            <a:endParaRPr lang="en-US" sz="1800" b="1" dirty="0"/>
           </a:p>
         </p:txBody>
       </p:sp>
@@ -3229,7 +3235,7 @@
         </p:blipFill>
         <p:spPr>
           <a:xfrm>
-            <a:off x="5711226" y="545703"/>
+            <a:off x="6964391" y="863186"/>
             <a:ext cx="603504" cy="393954"/>
           </a:xfrm>
           <a:prstGeom prst="rect">
@@ -3237,16 +3243,636 @@
           </a:prstGeom>
         </p:spPr>
       </p:pic>
-      <p:sp>
-        <p:nvSpPr>
-          <p:cNvPr id="46" name="TextBox 45"/>
+      <p:pic>
+        <p:nvPicPr>
+          <p:cNvPr id="17" name="Picture 16"/>
+          <p:cNvPicPr>
+            <a:picLocks noChangeAspect="1"/>
+          </p:cNvPicPr>
+          <p:nvPr/>
+        </p:nvPicPr>
+        <p:blipFill>
+          <a:blip r:embed="rId3">
+            <a:extLst>
+              <a:ext uri="{28A0092B-C50C-407E-A947-70E740481C1C}">
+                <a14:useLocalDpi xmlns:a14="http://schemas.microsoft.com/office/drawing/2010/main" val="0"/>
+              </a:ext>
+            </a:extLst>
+          </a:blip>
+          <a:stretch>
+            <a:fillRect/>
+          </a:stretch>
+        </p:blipFill>
+        <p:spPr>
+          <a:xfrm>
+            <a:off x="1690476" y="1524180"/>
+            <a:ext cx="479724" cy="498537"/>
+          </a:xfrm>
+          <a:prstGeom prst="rect">
+            <a:avLst/>
+          </a:prstGeom>
+        </p:spPr>
+      </p:pic>
+      <p:pic>
+        <p:nvPicPr>
+          <p:cNvPr id="19" name="Picture 18"/>
+          <p:cNvPicPr>
+            <a:picLocks noChangeAspect="1"/>
+          </p:cNvPicPr>
+          <p:nvPr/>
+        </p:nvPicPr>
+        <p:blipFill>
+          <a:blip r:embed="rId3">
+            <a:extLst>
+              <a:ext uri="{28A0092B-C50C-407E-A947-70E740481C1C}">
+                <a14:useLocalDpi xmlns:a14="http://schemas.microsoft.com/office/drawing/2010/main" val="0"/>
+              </a:ext>
+            </a:extLst>
+          </a:blip>
+          <a:stretch>
+            <a:fillRect/>
+          </a:stretch>
+        </p:blipFill>
+        <p:spPr>
+          <a:xfrm>
+            <a:off x="2383980" y="1524180"/>
+            <a:ext cx="479724" cy="498537"/>
+          </a:xfrm>
+          <a:prstGeom prst="rect">
+            <a:avLst/>
+          </a:prstGeom>
+        </p:spPr>
+      </p:pic>
+      <p:pic>
+        <p:nvPicPr>
+          <p:cNvPr id="20" name="Picture 19"/>
+          <p:cNvPicPr>
+            <a:picLocks noChangeAspect="1"/>
+          </p:cNvPicPr>
+          <p:nvPr/>
+        </p:nvPicPr>
+        <p:blipFill>
+          <a:blip r:embed="rId3">
+            <a:extLst>
+              <a:ext uri="{28A0092B-C50C-407E-A947-70E740481C1C}">
+                <a14:useLocalDpi xmlns:a14="http://schemas.microsoft.com/office/drawing/2010/main" val="0"/>
+              </a:ext>
+            </a:extLst>
+          </a:blip>
+          <a:stretch>
+            <a:fillRect/>
+          </a:stretch>
+        </p:blipFill>
+        <p:spPr>
+          <a:xfrm>
+            <a:off x="1690476" y="2241105"/>
+            <a:ext cx="479724" cy="498537"/>
+          </a:xfrm>
+          <a:prstGeom prst="rect">
+            <a:avLst/>
+          </a:prstGeom>
+        </p:spPr>
+      </p:pic>
+      <p:pic>
+        <p:nvPicPr>
+          <p:cNvPr id="21" name="Picture 20"/>
+          <p:cNvPicPr>
+            <a:picLocks noChangeAspect="1"/>
+          </p:cNvPicPr>
+          <p:nvPr/>
+        </p:nvPicPr>
+        <p:blipFill>
+          <a:blip r:embed="rId3">
+            <a:extLst>
+              <a:ext uri="{28A0092B-C50C-407E-A947-70E740481C1C}">
+                <a14:useLocalDpi xmlns:a14="http://schemas.microsoft.com/office/drawing/2010/main" val="0"/>
+              </a:ext>
+            </a:extLst>
+          </a:blip>
+          <a:stretch>
+            <a:fillRect/>
+          </a:stretch>
+        </p:blipFill>
+        <p:spPr>
+          <a:xfrm>
+            <a:off x="2383980" y="2241105"/>
+            <a:ext cx="479724" cy="498537"/>
+          </a:xfrm>
+          <a:prstGeom prst="rect">
+            <a:avLst/>
+          </a:prstGeom>
+        </p:spPr>
+      </p:pic>
+      <p:sp>
+        <p:nvSpPr>
+          <p:cNvPr id="24" name="TextBox 23"/>
           <p:cNvSpPr txBox="1"/>
           <p:nvPr/>
         </p:nvSpPr>
         <p:spPr>
           <a:xfrm>
-            <a:off x="6026781" y="1740747"/>
-            <a:ext cx="986167" cy="261610"/>
+            <a:off x="3238757" y="1685294"/>
+            <a:ext cx="2420923" cy="923330"/>
+          </a:xfrm>
+          <a:prstGeom prst="rect">
+            <a:avLst/>
+          </a:prstGeom>
+          <a:noFill/>
+        </p:spPr>
+        <p:txBody>
+          <a:bodyPr wrap="square" rtlCol="0">
+            <a:spAutoFit/>
+          </a:bodyPr>
+          <a:lstStyle/>
+          <a:p>
+            <a:r>
+              <a:rPr lang="en-US" b="1" dirty="0" smtClean="0">
+                <a:latin typeface="Amazon Ember" panose="02000000000000000000" pitchFamily="2" charset="0"/>
+                <a:ea typeface="Amazon Ember" panose="02000000000000000000" pitchFamily="2" charset="0"/>
+              </a:rPr>
+              <a:t>Centralize, protect and segregate </a:t>
+            </a:r>
+            <a:r>
+              <a:rPr lang="en-US" dirty="0" smtClean="0">
+                <a:latin typeface="Amazon Ember" panose="02000000000000000000" pitchFamily="2" charset="0"/>
+                <a:ea typeface="Amazon Ember" panose="02000000000000000000" pitchFamily="2" charset="0"/>
+              </a:rPr>
+              <a:t>all the code for Compliance. </a:t>
+            </a:r>
+            <a:endParaRPr lang="en-US" dirty="0">
+              <a:latin typeface="Amazon Ember" panose="02000000000000000000" pitchFamily="2" charset="0"/>
+              <a:ea typeface="Amazon Ember" panose="02000000000000000000" pitchFamily="2" charset="0"/>
+            </a:endParaRPr>
+          </a:p>
+        </p:txBody>
+      </p:sp>
+      <p:pic>
+        <p:nvPicPr>
+          <p:cNvPr id="26" name="Picture 25"/>
+          <p:cNvPicPr>
+            <a:picLocks noChangeAspect="1"/>
+          </p:cNvPicPr>
+          <p:nvPr/>
+        </p:nvPicPr>
+        <p:blipFill>
+          <a:blip r:embed="rId4">
+            <a:extLst>
+              <a:ext uri="{28A0092B-C50C-407E-A947-70E740481C1C}">
+                <a14:useLocalDpi xmlns:a14="http://schemas.microsoft.com/office/drawing/2010/main" val="0"/>
+              </a:ext>
+            </a:extLst>
+          </a:blip>
+          <a:stretch>
+            <a:fillRect/>
+          </a:stretch>
+        </p:blipFill>
+        <p:spPr>
+          <a:xfrm>
+            <a:off x="7222316" y="1441889"/>
+            <a:ext cx="475280" cy="570338"/>
+          </a:xfrm>
+          <a:prstGeom prst="rect">
+            <a:avLst/>
+          </a:prstGeom>
+        </p:spPr>
+      </p:pic>
+      <p:pic>
+        <p:nvPicPr>
+          <p:cNvPr id="27" name="Picture 26"/>
+          <p:cNvPicPr>
+            <a:picLocks noChangeAspect="1"/>
+          </p:cNvPicPr>
+          <p:nvPr/>
+        </p:nvPicPr>
+        <p:blipFill>
+          <a:blip r:embed="rId5">
+            <a:extLst>
+              <a:ext uri="{28A0092B-C50C-407E-A947-70E740481C1C}">
+                <a14:useLocalDpi xmlns:a14="http://schemas.microsoft.com/office/drawing/2010/main" val="0"/>
+              </a:ext>
+            </a:extLst>
+          </a:blip>
+          <a:stretch>
+            <a:fillRect/>
+          </a:stretch>
+        </p:blipFill>
+        <p:spPr>
+          <a:xfrm>
+            <a:off x="7542072" y="1707337"/>
+            <a:ext cx="318346" cy="439622"/>
+          </a:xfrm>
+          <a:prstGeom prst="rect">
+            <a:avLst/>
+          </a:prstGeom>
+        </p:spPr>
+      </p:pic>
+      <p:sp>
+        <p:nvSpPr>
+          <p:cNvPr id="28" name="Rectangle 27"/>
+          <p:cNvSpPr/>
+          <p:nvPr/>
+        </p:nvSpPr>
+        <p:spPr>
+          <a:xfrm>
+            <a:off x="7914500" y="1391444"/>
+            <a:ext cx="2919545" cy="1477328"/>
+          </a:xfrm>
+          <a:prstGeom prst="rect">
+            <a:avLst/>
+          </a:prstGeom>
+        </p:spPr>
+        <p:txBody>
+          <a:bodyPr wrap="square">
+            <a:spAutoFit/>
+          </a:bodyPr>
+          <a:lstStyle/>
+          <a:p>
+            <a:r>
+              <a:rPr lang="en-US" dirty="0" smtClean="0">
+                <a:latin typeface="Amazon Ember" panose="020B0603020204020204" pitchFamily="34" charset="0"/>
+                <a:ea typeface="Amazon Ember" panose="020B0603020204020204" pitchFamily="34" charset="0"/>
+                <a:cs typeface="Amazon Ember" panose="020B0603020204020204" pitchFamily="34" charset="0"/>
+              </a:rPr>
+              <a:t>Specific set of Config Rules (RuleSet), depending on the definition and nature of this AWS Account.</a:t>
+            </a:r>
+            <a:endParaRPr lang="en-US" dirty="0">
+              <a:latin typeface="Amazon Ember" panose="020B0603020204020204" pitchFamily="34" charset="0"/>
+              <a:ea typeface="Amazon Ember" panose="020B0603020204020204" pitchFamily="34" charset="0"/>
+              <a:cs typeface="Amazon Ember" panose="020B0603020204020204" pitchFamily="34" charset="0"/>
+            </a:endParaRPr>
+          </a:p>
+        </p:txBody>
+      </p:sp>
+      <p:sp>
+        <p:nvSpPr>
+          <p:cNvPr id="29" name="Rectangle 28"/>
+          <p:cNvSpPr/>
+          <p:nvPr/>
+        </p:nvSpPr>
+        <p:spPr>
+          <a:xfrm>
+            <a:off x="3238757" y="3489533"/>
+            <a:ext cx="2333064" cy="1200329"/>
+          </a:xfrm>
+          <a:prstGeom prst="rect">
+            <a:avLst/>
+          </a:prstGeom>
+        </p:spPr>
+        <p:txBody>
+          <a:bodyPr wrap="square">
+            <a:spAutoFit/>
+          </a:bodyPr>
+          <a:lstStyle/>
+          <a:p>
+            <a:r>
+              <a:rPr lang="en-US" b="1" dirty="0" smtClean="0">
+                <a:latin typeface="Amazon Ember" panose="020B0603020204020204" pitchFamily="34" charset="0"/>
+                <a:ea typeface="Amazon Ember" panose="020B0603020204020204" pitchFamily="34" charset="0"/>
+                <a:cs typeface="Amazon Ember" panose="020B0603020204020204" pitchFamily="34" charset="0"/>
+              </a:rPr>
+              <a:t>Store </a:t>
+            </a:r>
+            <a:r>
+              <a:rPr lang="en-US" b="1" dirty="0" smtClean="0">
+                <a:latin typeface="Amazon Ember" panose="020B0603020204020204" pitchFamily="34" charset="0"/>
+                <a:ea typeface="Amazon Ember" panose="020B0603020204020204" pitchFamily="34" charset="0"/>
+                <a:cs typeface="Amazon Ember" panose="020B0603020204020204" pitchFamily="34" charset="0"/>
+              </a:rPr>
+              <a:t>securely all </a:t>
+            </a:r>
+            <a:r>
+              <a:rPr lang="en-US" b="1" dirty="0">
+                <a:latin typeface="Amazon Ember" panose="020B0603020204020204" pitchFamily="34" charset="0"/>
+                <a:ea typeface="Amazon Ember" panose="020B0603020204020204" pitchFamily="34" charset="0"/>
+                <a:cs typeface="Amazon Ember" panose="020B0603020204020204" pitchFamily="34" charset="0"/>
+              </a:rPr>
+              <a:t>compliance </a:t>
+            </a:r>
+            <a:r>
+              <a:rPr lang="en-US" b="1" dirty="0" smtClean="0">
+                <a:latin typeface="Amazon Ember" panose="020B0603020204020204" pitchFamily="34" charset="0"/>
+                <a:ea typeface="Amazon Ember" panose="020B0603020204020204" pitchFamily="34" charset="0"/>
+                <a:cs typeface="Amazon Ember" panose="020B0603020204020204" pitchFamily="34" charset="0"/>
+              </a:rPr>
+              <a:t>events </a:t>
+            </a:r>
+            <a:r>
+              <a:rPr lang="en-US" dirty="0">
+                <a:latin typeface="Amazon Ember" panose="020B0603020204020204" pitchFamily="34" charset="0"/>
+                <a:ea typeface="Amazon Ember" panose="020B0603020204020204" pitchFamily="34" charset="0"/>
+                <a:cs typeface="Amazon Ember" panose="020B0603020204020204" pitchFamily="34" charset="0"/>
+              </a:rPr>
+              <a:t>of all resources over </a:t>
+            </a:r>
+            <a:r>
+              <a:rPr lang="en-US" dirty="0" smtClean="0">
+                <a:latin typeface="Amazon Ember" panose="020B0603020204020204" pitchFamily="34" charset="0"/>
+                <a:ea typeface="Amazon Ember" panose="020B0603020204020204" pitchFamily="34" charset="0"/>
+                <a:cs typeface="Amazon Ember" panose="020B0603020204020204" pitchFamily="34" charset="0"/>
+              </a:rPr>
+              <a:t>time.</a:t>
+            </a:r>
+            <a:endParaRPr lang="en-US" dirty="0">
+              <a:latin typeface="Amazon Ember" panose="020B0603020204020204" pitchFamily="34" charset="0"/>
+              <a:ea typeface="Amazon Ember" panose="020B0603020204020204" pitchFamily="34" charset="0"/>
+              <a:cs typeface="Amazon Ember" panose="020B0603020204020204" pitchFamily="34" charset="0"/>
+            </a:endParaRPr>
+          </a:p>
+        </p:txBody>
+      </p:sp>
+      <p:pic>
+        <p:nvPicPr>
+          <p:cNvPr id="30" name="Picture 29"/>
+          <p:cNvPicPr>
+            <a:picLocks noChangeAspect="1"/>
+          </p:cNvPicPr>
+          <p:nvPr/>
+        </p:nvPicPr>
+        <p:blipFill>
+          <a:blip r:embed="rId6">
+            <a:extLst>
+              <a:ext uri="{28A0092B-C50C-407E-A947-70E740481C1C}">
+                <a14:useLocalDpi xmlns:a14="http://schemas.microsoft.com/office/drawing/2010/main" val="0"/>
+              </a:ext>
+            </a:extLst>
+          </a:blip>
+          <a:stretch>
+            <a:fillRect/>
+          </a:stretch>
+        </p:blipFill>
+        <p:spPr>
+          <a:xfrm>
+            <a:off x="1936913" y="3620294"/>
+            <a:ext cx="630854" cy="757027"/>
+          </a:xfrm>
+          <a:prstGeom prst="rect">
+            <a:avLst/>
+          </a:prstGeom>
+        </p:spPr>
+      </p:pic>
+      <p:sp>
+        <p:nvSpPr>
+          <p:cNvPr id="31" name="Rectangle 30"/>
+          <p:cNvSpPr/>
+          <p:nvPr/>
+        </p:nvSpPr>
+        <p:spPr>
+          <a:xfrm>
+            <a:off x="1429037" y="2769060"/>
+            <a:ext cx="1646605" cy="307777"/>
+          </a:xfrm>
+          <a:prstGeom prst="rect">
+            <a:avLst/>
+          </a:prstGeom>
+        </p:spPr>
+        <p:txBody>
+          <a:bodyPr wrap="none">
+            <a:spAutoFit/>
+          </a:bodyPr>
+          <a:lstStyle/>
+          <a:p>
+            <a:r>
+              <a:rPr lang="en-US" sz="1400" dirty="0">
+                <a:latin typeface="Amazon Ember" panose="02000000000000000000" pitchFamily="2" charset="0"/>
+                <a:ea typeface="Amazon Ember" panose="02000000000000000000" pitchFamily="2" charset="0"/>
+              </a:rPr>
+              <a:t>Lambda functions</a:t>
+            </a:r>
+          </a:p>
+        </p:txBody>
+      </p:sp>
+      <p:sp>
+        <p:nvSpPr>
+          <p:cNvPr id="32" name="Rectangle 31"/>
+          <p:cNvSpPr/>
+          <p:nvPr/>
+        </p:nvSpPr>
+        <p:spPr>
+          <a:xfrm>
+            <a:off x="1755247" y="4382085"/>
+            <a:ext cx="994183" cy="307777"/>
+          </a:xfrm>
+          <a:prstGeom prst="rect">
+            <a:avLst/>
+          </a:prstGeom>
+        </p:spPr>
+        <p:txBody>
+          <a:bodyPr wrap="none">
+            <a:spAutoFit/>
+          </a:bodyPr>
+          <a:lstStyle/>
+          <a:p>
+            <a:r>
+              <a:rPr lang="en-US" sz="1400" dirty="0">
+                <a:latin typeface="Amazon Ember" panose="02000000000000000000" pitchFamily="2" charset="0"/>
+                <a:ea typeface="Amazon Ember" panose="02000000000000000000" pitchFamily="2" charset="0"/>
+              </a:rPr>
+              <a:t>S3 Bucket</a:t>
+            </a:r>
+          </a:p>
+        </p:txBody>
+      </p:sp>
+      <p:pic>
+        <p:nvPicPr>
+          <p:cNvPr id="33" name="Picture 32"/>
+          <p:cNvPicPr>
+            <a:picLocks noChangeAspect="1"/>
+          </p:cNvPicPr>
+          <p:nvPr/>
+        </p:nvPicPr>
+        <p:blipFill rotWithShape="1">
+          <a:blip r:embed="rId7">
+            <a:extLst>
+              <a:ext uri="{28A0092B-C50C-407E-A947-70E740481C1C}">
+                <a14:useLocalDpi xmlns:a14="http://schemas.microsoft.com/office/drawing/2010/main" val="0"/>
+              </a:ext>
+            </a:extLst>
+          </a:blip>
+          <a:srcRect r="75978"/>
+          <a:stretch/>
+        </p:blipFill>
+        <p:spPr>
+          <a:xfrm>
+            <a:off x="1930338" y="5273584"/>
+            <a:ext cx="720967" cy="721526"/>
+          </a:xfrm>
+          <a:prstGeom prst="rect">
+            <a:avLst/>
+          </a:prstGeom>
+        </p:spPr>
+      </p:pic>
+      <p:sp>
+        <p:nvSpPr>
+          <p:cNvPr id="34" name="Rectangle 33"/>
+          <p:cNvSpPr/>
+          <p:nvPr/>
+        </p:nvSpPr>
+        <p:spPr>
+          <a:xfrm>
+            <a:off x="1368934" y="6024495"/>
+            <a:ext cx="1843774" cy="523220"/>
+          </a:xfrm>
+          <a:prstGeom prst="rect">
+            <a:avLst/>
+          </a:prstGeom>
+        </p:spPr>
+        <p:txBody>
+          <a:bodyPr wrap="none">
+            <a:spAutoFit/>
+          </a:bodyPr>
+          <a:lstStyle/>
+          <a:p>
+            <a:r>
+              <a:rPr lang="en-US" sz="1400" dirty="0" smtClean="0">
+                <a:latin typeface="Amazon Ember" panose="02000000000000000000" pitchFamily="2" charset="0"/>
+                <a:ea typeface="Amazon Ember" panose="02000000000000000000" pitchFamily="2" charset="0"/>
+              </a:rPr>
+              <a:t>Analytics Dashboard</a:t>
+            </a:r>
+          </a:p>
+          <a:p>
+            <a:pPr algn="ctr"/>
+            <a:r>
+              <a:rPr lang="en-US" sz="1400" dirty="0" smtClean="0">
+                <a:latin typeface="Amazon Ember" panose="02000000000000000000" pitchFamily="2" charset="0"/>
+                <a:ea typeface="Amazon Ember" panose="02000000000000000000" pitchFamily="2" charset="0"/>
+              </a:rPr>
+              <a:t>(e.g. </a:t>
+            </a:r>
+            <a:r>
+              <a:rPr lang="en-US" sz="1400" dirty="0" err="1" smtClean="0">
+                <a:latin typeface="Amazon Ember" panose="02000000000000000000" pitchFamily="2" charset="0"/>
+                <a:ea typeface="Amazon Ember" panose="02000000000000000000" pitchFamily="2" charset="0"/>
+              </a:rPr>
+              <a:t>QuickSight</a:t>
+            </a:r>
+            <a:r>
+              <a:rPr lang="en-US" sz="1400" dirty="0" smtClean="0">
+                <a:latin typeface="Amazon Ember" panose="02000000000000000000" pitchFamily="2" charset="0"/>
+                <a:ea typeface="Amazon Ember" panose="02000000000000000000" pitchFamily="2" charset="0"/>
+              </a:rPr>
+              <a:t>)</a:t>
+            </a:r>
+            <a:endParaRPr lang="en-US" sz="1400" dirty="0">
+              <a:latin typeface="Amazon Ember" panose="02000000000000000000" pitchFamily="2" charset="0"/>
+              <a:ea typeface="Amazon Ember" panose="02000000000000000000" pitchFamily="2" charset="0"/>
+            </a:endParaRPr>
+          </a:p>
+        </p:txBody>
+      </p:sp>
+      <p:sp>
+        <p:nvSpPr>
+          <p:cNvPr id="35" name="Rectangle 34"/>
+          <p:cNvSpPr/>
+          <p:nvPr/>
+        </p:nvSpPr>
+        <p:spPr>
+          <a:xfrm>
+            <a:off x="3238757" y="5273584"/>
+            <a:ext cx="2333064" cy="1200329"/>
+          </a:xfrm>
+          <a:prstGeom prst="rect">
+            <a:avLst/>
+          </a:prstGeom>
+        </p:spPr>
+        <p:txBody>
+          <a:bodyPr wrap="square">
+            <a:spAutoFit/>
+          </a:bodyPr>
+          <a:lstStyle/>
+          <a:p>
+            <a:r>
+              <a:rPr lang="en-US" b="1" dirty="0" smtClean="0">
+                <a:latin typeface="Amazon Ember" panose="020B0603020204020204" pitchFamily="34" charset="0"/>
+                <a:ea typeface="Amazon Ember" panose="020B0603020204020204" pitchFamily="34" charset="0"/>
+                <a:cs typeface="Amazon Ember" panose="020B0603020204020204" pitchFamily="34" charset="0"/>
+              </a:rPr>
+              <a:t>Visualize and get insights </a:t>
+            </a:r>
+            <a:r>
+              <a:rPr lang="en-US" dirty="0" smtClean="0">
+                <a:latin typeface="Amazon Ember" panose="020B0603020204020204" pitchFamily="34" charset="0"/>
+                <a:ea typeface="Amazon Ember" panose="020B0603020204020204" pitchFamily="34" charset="0"/>
+                <a:cs typeface="Amazon Ember" panose="020B0603020204020204" pitchFamily="34" charset="0"/>
+              </a:rPr>
+              <a:t>on the data generated from compliance events.</a:t>
+            </a:r>
+            <a:endParaRPr lang="en-US" dirty="0">
+              <a:latin typeface="Amazon Ember" panose="020B0603020204020204" pitchFamily="34" charset="0"/>
+              <a:ea typeface="Amazon Ember" panose="020B0603020204020204" pitchFamily="34" charset="0"/>
+              <a:cs typeface="Amazon Ember" panose="020B0603020204020204" pitchFamily="34" charset="0"/>
+            </a:endParaRPr>
+          </a:p>
+        </p:txBody>
+      </p:sp>
+      <p:sp>
+        <p:nvSpPr>
+          <p:cNvPr id="36" name="Rounded Rectangle 35"/>
+          <p:cNvSpPr/>
+          <p:nvPr/>
+        </p:nvSpPr>
+        <p:spPr>
+          <a:xfrm>
+            <a:off x="6754535" y="3704936"/>
+            <a:ext cx="4350367" cy="1782071"/>
+          </a:xfrm>
+          <a:prstGeom prst="roundRect">
+            <a:avLst>
+              <a:gd name="adj" fmla="val 9818"/>
+            </a:avLst>
+          </a:prstGeom>
+          <a:noFill/>
+          <a:ln w="6350">
+            <a:solidFill>
+              <a:schemeClr val="tx1"/>
+            </a:solidFill>
+            <a:prstDash val="solid"/>
+          </a:ln>
+          <a:effectLst/>
+        </p:spPr>
+        <p:style>
+          <a:lnRef idx="1">
+            <a:schemeClr val="accent1"/>
+          </a:lnRef>
+          <a:fillRef idx="3">
+            <a:schemeClr val="accent1"/>
+          </a:fillRef>
+          <a:effectRef idx="2">
+            <a:schemeClr val="accent1"/>
+          </a:effectRef>
+          <a:fontRef idx="minor">
+            <a:schemeClr val="lt1"/>
+          </a:fontRef>
+        </p:style>
+        <p:txBody>
+          <a:bodyPr anchor="ctr"/>
+          <a:lstStyle/>
+          <a:p>
+            <a:pPr algn="ctr">
+              <a:defRPr/>
+            </a:pPr>
+            <a:endParaRPr lang="en-US" dirty="0">
+              <a:solidFill>
+                <a:schemeClr val="tx1"/>
+              </a:solidFill>
+              <a:latin typeface="Arial"/>
+              <a:cs typeface="Arial"/>
+            </a:endParaRPr>
+          </a:p>
+        </p:txBody>
+      </p:sp>
+      <p:sp>
+        <p:nvSpPr>
+          <p:cNvPr id="37" name="TextBox 36"/>
+          <p:cNvSpPr txBox="1">
+            <a:spLocks noChangeArrowheads="1"/>
+          </p:cNvSpPr>
+          <p:nvPr/>
+        </p:nvSpPr>
+        <p:spPr bwMode="auto">
+          <a:xfrm>
+            <a:off x="7728549" y="3443326"/>
+            <a:ext cx="2778790" cy="261610"/>
           </a:xfrm>
           <a:prstGeom prst="rect">
             <a:avLst/>
@@ -3276,22 +3902,27 @@
           </a:lstStyle>
           <a:p>
             <a:r>
-              <a:rPr lang="en-US" dirty="0"/>
-              <a:t>Config Rules</a:t>
-            </a:r>
+              <a:rPr lang="en-US" sz="1800" b="1" dirty="0"/>
+              <a:t>Application </a:t>
+            </a:r>
+            <a:r>
+              <a:rPr lang="en-US" sz="1800" b="1" dirty="0" smtClean="0"/>
+              <a:t>Account 2</a:t>
+            </a:r>
+            <a:endParaRPr lang="en-US" sz="1800" b="1" dirty="0"/>
           </a:p>
         </p:txBody>
       </p:sp>
       <p:pic>
         <p:nvPicPr>
-          <p:cNvPr id="39" name="Picture 38"/>
+          <p:cNvPr id="38" name="Picture 37"/>
           <p:cNvPicPr>
             <a:picLocks noChangeAspect="1"/>
           </p:cNvPicPr>
           <p:nvPr/>
         </p:nvPicPr>
         <p:blipFill>
-          <a:blip r:embed="rId3">
+          <a:blip r:embed="rId2">
             <a:extLst>
               <a:ext uri="{28A0092B-C50C-407E-A947-70E740481C1C}">
                 <a14:useLocalDpi xmlns:a14="http://schemas.microsoft.com/office/drawing/2010/main" val="0"/>
@@ -3304,7 +3935,187 @@
         </p:blipFill>
         <p:spPr>
           <a:xfrm>
-            <a:off x="6282223" y="1153549"/>
+            <a:off x="6930448" y="3436080"/>
+            <a:ext cx="603504" cy="393954"/>
+          </a:xfrm>
+          <a:prstGeom prst="rect">
+            <a:avLst/>
+          </a:prstGeom>
+        </p:spPr>
+      </p:pic>
+      <p:sp>
+        <p:nvSpPr>
+          <p:cNvPr id="48" name="Rectangle 47"/>
+          <p:cNvSpPr/>
+          <p:nvPr/>
+        </p:nvSpPr>
+        <p:spPr>
+          <a:xfrm>
+            <a:off x="7697596" y="5914391"/>
+            <a:ext cx="2333064" cy="369332"/>
+          </a:xfrm>
+          <a:prstGeom prst="rect">
+            <a:avLst/>
+          </a:prstGeom>
+        </p:spPr>
+        <p:txBody>
+          <a:bodyPr wrap="square">
+            <a:spAutoFit/>
+          </a:bodyPr>
+          <a:lstStyle/>
+          <a:p>
+            <a:pPr algn="ctr"/>
+            <a:r>
+              <a:rPr lang="en-US" dirty="0" smtClean="0">
+                <a:latin typeface="Amazon Ember" panose="020B0603020204020204" pitchFamily="34" charset="0"/>
+                <a:ea typeface="Amazon Ember" panose="020B0603020204020204" pitchFamily="34" charset="0"/>
+                <a:cs typeface="Amazon Ember" panose="020B0603020204020204" pitchFamily="34" charset="0"/>
+              </a:rPr>
+              <a:t>…</a:t>
+            </a:r>
+            <a:endParaRPr lang="en-US" dirty="0">
+              <a:latin typeface="Amazon Ember" panose="020B0603020204020204" pitchFamily="34" charset="0"/>
+              <a:ea typeface="Amazon Ember" panose="020B0603020204020204" pitchFamily="34" charset="0"/>
+              <a:cs typeface="Amazon Ember" panose="020B0603020204020204" pitchFamily="34" charset="0"/>
+            </a:endParaRPr>
+          </a:p>
+        </p:txBody>
+      </p:sp>
+      <p:pic>
+        <p:nvPicPr>
+          <p:cNvPr id="49" name="Picture 48"/>
+          <p:cNvPicPr>
+            <a:picLocks noChangeAspect="1"/>
+          </p:cNvPicPr>
+          <p:nvPr/>
+        </p:nvPicPr>
+        <p:blipFill>
+          <a:blip r:embed="rId8">
+            <a:extLst>
+              <a:ext uri="{28A0092B-C50C-407E-A947-70E740481C1C}">
+                <a14:useLocalDpi xmlns:a14="http://schemas.microsoft.com/office/drawing/2010/main" val="0"/>
+              </a:ext>
+            </a:extLst>
+          </a:blip>
+          <a:stretch>
+            <a:fillRect/>
+          </a:stretch>
+        </p:blipFill>
+        <p:spPr>
+          <a:xfrm>
+            <a:off x="1973725" y="7052802"/>
+            <a:ext cx="634192" cy="758952"/>
+          </a:xfrm>
+          <a:prstGeom prst="rect">
+            <a:avLst/>
+          </a:prstGeom>
+        </p:spPr>
+      </p:pic>
+      <p:sp>
+        <p:nvSpPr>
+          <p:cNvPr id="50" name="TextBox 49"/>
+          <p:cNvSpPr txBox="1"/>
+          <p:nvPr/>
+        </p:nvSpPr>
+        <p:spPr>
+          <a:xfrm>
+            <a:off x="1822270" y="7811754"/>
+            <a:ext cx="943550" cy="155448"/>
+          </a:xfrm>
+          <a:prstGeom prst="rect">
+            <a:avLst/>
+          </a:prstGeom>
+          <a:noFill/>
+        </p:spPr>
+        <p:txBody>
+          <a:bodyPr wrap="square" lIns="0" tIns="0" rIns="0" bIns="0" rtlCol="0" anchor="t">
+            <a:noAutofit/>
+          </a:bodyPr>
+          <a:lstStyle/>
+          <a:p>
+            <a:pPr algn="ctr"/>
+            <a:r>
+              <a:rPr lang="en-US" sz="1400" dirty="0" smtClean="0">
+                <a:latin typeface="Amazon Ember" panose="02000000000000000000" pitchFamily="2" charset="0"/>
+                <a:ea typeface="Amazon Ember" panose="02000000000000000000" pitchFamily="2" charset="0"/>
+              </a:rPr>
+              <a:t>Pipeline</a:t>
+            </a:r>
+            <a:endParaRPr lang="en-US" sz="1400" dirty="0">
+              <a:latin typeface="Amazon Ember" panose="02000000000000000000" pitchFamily="2" charset="0"/>
+              <a:ea typeface="Amazon Ember" panose="02000000000000000000" pitchFamily="2" charset="0"/>
+            </a:endParaRPr>
+          </a:p>
+        </p:txBody>
+      </p:sp>
+      <p:sp>
+        <p:nvSpPr>
+          <p:cNvPr id="51" name="Rectangle 50"/>
+          <p:cNvSpPr/>
+          <p:nvPr/>
+        </p:nvSpPr>
+        <p:spPr>
+          <a:xfrm>
+            <a:off x="3238756" y="7052802"/>
+            <a:ext cx="2420923" cy="923330"/>
+          </a:xfrm>
+          <a:prstGeom prst="rect">
+            <a:avLst/>
+          </a:prstGeom>
+        </p:spPr>
+        <p:txBody>
+          <a:bodyPr wrap="square">
+            <a:spAutoFit/>
+          </a:bodyPr>
+          <a:lstStyle/>
+          <a:p>
+            <a:r>
+              <a:rPr lang="en-US" b="1" dirty="0" smtClean="0">
+                <a:latin typeface="Amazon Ember" panose="020B0603020204020204" pitchFamily="34" charset="0"/>
+                <a:ea typeface="Amazon Ember" panose="020B0603020204020204" pitchFamily="34" charset="0"/>
+                <a:cs typeface="Amazon Ember" panose="020B0603020204020204" pitchFamily="34" charset="0"/>
+              </a:rPr>
+              <a:t>Deploy continuously and automatically </a:t>
+            </a:r>
+            <a:r>
+              <a:rPr lang="en-US" dirty="0" smtClean="0">
+                <a:latin typeface="Amazon Ember" panose="020B0603020204020204" pitchFamily="34" charset="0"/>
+                <a:ea typeface="Amazon Ember" panose="020B0603020204020204" pitchFamily="34" charset="0"/>
+                <a:cs typeface="Amazon Ember" panose="020B0603020204020204" pitchFamily="34" charset="0"/>
+              </a:rPr>
+              <a:t>in all AWS accounts.</a:t>
+            </a:r>
+            <a:endParaRPr lang="en-US" dirty="0">
+              <a:latin typeface="Amazon Ember" panose="020B0603020204020204" pitchFamily="34" charset="0"/>
+              <a:ea typeface="Amazon Ember" panose="020B0603020204020204" pitchFamily="34" charset="0"/>
+              <a:cs typeface="Amazon Ember" panose="020B0603020204020204" pitchFamily="34" charset="0"/>
+            </a:endParaRPr>
+          </a:p>
+        </p:txBody>
+      </p:sp>
+      <p:pic>
+        <p:nvPicPr>
+          <p:cNvPr id="52" name="Picture 51"/>
+          <p:cNvPicPr>
+            <a:picLocks noChangeAspect="1"/>
+          </p:cNvPicPr>
+          <p:nvPr/>
+        </p:nvPicPr>
+        <p:blipFill>
+          <a:blip r:embed="rId4">
+            <a:extLst>
+              <a:ext uri="{28A0092B-C50C-407E-A947-70E740481C1C}">
+                <a14:useLocalDpi xmlns:a14="http://schemas.microsoft.com/office/drawing/2010/main" val="0"/>
+              </a:ext>
+            </a:extLst>
+          </a:blip>
+          <a:stretch>
+            <a:fillRect/>
+          </a:stretch>
+        </p:blipFill>
+        <p:spPr>
+          <a:xfrm>
+            <a:off x="7222316" y="3984113"/>
             <a:ext cx="475280" cy="570338"/>
           </a:xfrm>
           <a:prstGeom prst="rect">
@@ -3312,16 +4123,141 @@
           </a:prstGeom>
         </p:spPr>
       </p:pic>
-      <p:sp>
-        <p:nvSpPr>
-          <p:cNvPr id="47" name="TextBox 46"/>
-          <p:cNvSpPr txBox="1"/>
-          <p:nvPr/>
-        </p:nvSpPr>
-        <p:spPr>
-          <a:xfrm>
-            <a:off x="1648348" y="3876126"/>
-            <a:ext cx="1849231" cy="430887"/>
+      <p:pic>
+        <p:nvPicPr>
+          <p:cNvPr id="53" name="Picture 52"/>
+          <p:cNvPicPr>
+            <a:picLocks noChangeAspect="1"/>
+          </p:cNvPicPr>
+          <p:nvPr/>
+        </p:nvPicPr>
+        <p:blipFill>
+          <a:blip r:embed="rId5">
+            <a:extLst>
+              <a:ext uri="{28A0092B-C50C-407E-A947-70E740481C1C}">
+                <a14:useLocalDpi xmlns:a14="http://schemas.microsoft.com/office/drawing/2010/main" val="0"/>
+              </a:ext>
+            </a:extLst>
+          </a:blip>
+          <a:stretch>
+            <a:fillRect/>
+          </a:stretch>
+        </p:blipFill>
+        <p:spPr>
+          <a:xfrm>
+            <a:off x="7542072" y="4249561"/>
+            <a:ext cx="318346" cy="439622"/>
+          </a:xfrm>
+          <a:prstGeom prst="rect">
+            <a:avLst/>
+          </a:prstGeom>
+        </p:spPr>
+      </p:pic>
+      <p:sp>
+        <p:nvSpPr>
+          <p:cNvPr id="54" name="Rectangle 53"/>
+          <p:cNvSpPr/>
+          <p:nvPr/>
+        </p:nvSpPr>
+        <p:spPr>
+          <a:xfrm>
+            <a:off x="7914500" y="3933668"/>
+            <a:ext cx="2919545" cy="1200329"/>
+          </a:xfrm>
+          <a:prstGeom prst="rect">
+            <a:avLst/>
+          </a:prstGeom>
+        </p:spPr>
+        <p:txBody>
+          <a:bodyPr wrap="square">
+            <a:spAutoFit/>
+          </a:bodyPr>
+          <a:lstStyle/>
+          <a:p>
+            <a:r>
+              <a:rPr lang="en-US" dirty="0" smtClean="0">
+                <a:latin typeface="Amazon Ember" panose="020B0603020204020204" pitchFamily="34" charset="0"/>
+                <a:ea typeface="Amazon Ember" panose="020B0603020204020204" pitchFamily="34" charset="0"/>
+                <a:cs typeface="Amazon Ember" panose="020B0603020204020204" pitchFamily="34" charset="0"/>
+              </a:rPr>
+              <a:t>Specific set of Config Rules (RuleSet), same or different from other AWS Accounts.</a:t>
+            </a:r>
+            <a:endParaRPr lang="en-US" dirty="0">
+              <a:latin typeface="Amazon Ember" panose="020B0603020204020204" pitchFamily="34" charset="0"/>
+              <a:ea typeface="Amazon Ember" panose="020B0603020204020204" pitchFamily="34" charset="0"/>
+              <a:cs typeface="Amazon Ember" panose="020B0603020204020204" pitchFamily="34" charset="0"/>
+            </a:endParaRPr>
+          </a:p>
+        </p:txBody>
+      </p:sp>
+      <p:sp>
+        <p:nvSpPr>
+          <p:cNvPr id="55" name="Rounded Rectangle 54"/>
+          <p:cNvSpPr/>
+          <p:nvPr/>
+        </p:nvSpPr>
+        <p:spPr>
+          <a:xfrm>
+            <a:off x="6788478" y="6979964"/>
+            <a:ext cx="4350367" cy="1782071"/>
+          </a:xfrm>
+          <a:prstGeom prst="roundRect">
+            <a:avLst>
+              <a:gd name="adj" fmla="val 9818"/>
+            </a:avLst>
+          </a:prstGeom>
+          <a:noFill/>
+          <a:ln w="6350">
+            <a:solidFill>
+              <a:schemeClr val="tx1"/>
+            </a:solidFill>
+            <a:prstDash val="solid"/>
+          </a:ln>
+          <a:effectLst/>
+        </p:spPr>
+        <p:style>
+          <a:lnRef idx="1">
+            <a:schemeClr val="accent1"/>
+          </a:lnRef>
+          <a:fillRef idx="3">
+            <a:schemeClr val="accent1"/>
+          </a:fillRef>
+          <a:effectRef idx="2">
+            <a:schemeClr val="accent1"/>
+          </a:effectRef>
+          <a:fontRef idx="minor">
+            <a:schemeClr val="lt1"/>
+          </a:fontRef>
+        </p:style>
+        <p:txBody>
+          <a:bodyPr anchor="ctr"/>
+          <a:lstStyle/>
+          <a:p>
+            <a:pPr algn="ctr">
+              <a:defRPr/>
+            </a:pPr>
+            <a:endParaRPr lang="en-US" dirty="0">
+              <a:solidFill>
+                <a:schemeClr val="tx1"/>
+              </a:solidFill>
+              <a:latin typeface="Arial"/>
+              <a:cs typeface="Arial"/>
+            </a:endParaRPr>
+          </a:p>
+        </p:txBody>
+      </p:sp>
+      <p:sp>
+        <p:nvSpPr>
+          <p:cNvPr id="56" name="TextBox 55"/>
+          <p:cNvSpPr txBox="1">
+            <a:spLocks noChangeArrowheads="1"/>
+          </p:cNvSpPr>
+          <p:nvPr/>
+        </p:nvSpPr>
+        <p:spPr bwMode="auto">
+          <a:xfrm>
+            <a:off x="7762492" y="6718354"/>
+            <a:ext cx="2778790" cy="261610"/>
           </a:xfrm>
           <a:prstGeom prst="rect">
             <a:avLst/>
@@ -3351,226 +4287,27 @@
           </a:lstStyle>
           <a:p>
             <a:r>
-              <a:rPr lang="en-US" dirty="0" smtClean="0"/>
-              <a:t>Kinesis Firehose</a:t>
-            </a:r>
-            <a:endParaRPr lang="en-US" dirty="0"/>
-          </a:p>
-          <a:p>
-            <a:r>
-              <a:rPr lang="en-US" i="1" dirty="0"/>
-              <a:t>Firehose-Compliance-as-code</a:t>
-            </a:r>
-          </a:p>
-        </p:txBody>
-      </p:sp>
-      <p:grpSp>
-        <p:nvGrpSpPr>
-          <p:cNvPr id="2" name="Group 1"/>
-          <p:cNvGrpSpPr/>
-          <p:nvPr/>
-        </p:nvGrpSpPr>
-        <p:grpSpPr>
-          <a:xfrm>
-            <a:off x="983542" y="1206696"/>
-            <a:ext cx="1837458" cy="905321"/>
-            <a:chOff x="1500148" y="2801184"/>
-            <a:chExt cx="1837458" cy="905321"/>
-          </a:xfrm>
-        </p:grpSpPr>
-        <p:pic>
-          <p:nvPicPr>
-            <p:cNvPr id="49" name="Picture 48"/>
-            <p:cNvPicPr>
-              <a:picLocks noChangeAspect="1"/>
-            </p:cNvPicPr>
-            <p:nvPr/>
-          </p:nvPicPr>
-          <p:blipFill>
-            <a:blip r:embed="rId4">
-              <a:extLst>
-                <a:ext uri="{28A0092B-C50C-407E-A947-70E740481C1C}">
-                  <a14:useLocalDpi xmlns:a14="http://schemas.microsoft.com/office/drawing/2010/main" val="0"/>
-                </a:ext>
-              </a:extLst>
-            </a:blip>
-            <a:stretch>
-              <a:fillRect/>
-            </a:stretch>
-          </p:blipFill>
-          <p:spPr>
-            <a:xfrm>
-              <a:off x="2200471" y="2801184"/>
-              <a:ext cx="472440" cy="566928"/>
-            </a:xfrm>
-            <a:prstGeom prst="rect">
-              <a:avLst/>
-            </a:prstGeom>
-          </p:spPr>
-        </p:pic>
-        <p:sp>
-          <p:nvSpPr>
-            <p:cNvPr id="50" name="TextBox 49"/>
-            <p:cNvSpPr txBox="1">
-              <a:spLocks noChangeArrowheads="1"/>
-            </p:cNvSpPr>
-            <p:nvPr/>
-          </p:nvSpPr>
-          <p:spPr bwMode="auto">
-            <a:xfrm>
-              <a:off x="1500148" y="3444895"/>
-              <a:ext cx="1837458" cy="261610"/>
-            </a:xfrm>
-            <a:prstGeom prst="rect">
-              <a:avLst/>
-            </a:prstGeom>
-            <a:noFill/>
-          </p:spPr>
-          <p:txBody>
-            <a:bodyPr wrap="square" lIns="0" tIns="0" rIns="0" bIns="0" rtlCol="0" anchor="ctr">
-              <a:noAutofit/>
-            </a:bodyPr>
-            <a:lstStyle>
-              <a:defPPr>
-                <a:defRPr lang="en-US"/>
-              </a:defPPr>
-              <a:lvl1pPr algn="ctr">
-                <a:defRPr sz="1100">
-                  <a:solidFill>
-                    <a:schemeClr val="tx1">
-                      <a:lumMod val="95000"/>
-                    </a:schemeClr>
-                  </a:solidFill>
-                  <a:latin typeface="Amazon Ember"/>
-                  <a:ea typeface="Amazon Ember Light" charset="0"/>
-                  <a:cs typeface="Amazon Ember Light" charset="0"/>
-                </a:defRPr>
-              </a:lvl1pPr>
-            </a:lstStyle>
-            <a:p>
-              <a:r>
-                <a:rPr lang="en-US" dirty="0"/>
-                <a:t>Lambda functions</a:t>
-              </a:r>
-            </a:p>
-            <a:p>
-              <a:r>
-                <a:rPr lang="en-US" dirty="0"/>
-                <a:t> (Custom Rules)</a:t>
-              </a:r>
-            </a:p>
-          </p:txBody>
-        </p:sp>
-      </p:grpSp>
-      <p:grpSp>
-        <p:nvGrpSpPr>
-          <p:cNvPr id="59" name="Group 58"/>
-          <p:cNvGrpSpPr/>
-          <p:nvPr/>
-        </p:nvGrpSpPr>
-        <p:grpSpPr>
-          <a:xfrm>
-            <a:off x="675031" y="2320078"/>
-            <a:ext cx="2445656" cy="867613"/>
-            <a:chOff x="-464240" y="3055079"/>
-            <a:chExt cx="2445656" cy="867613"/>
-          </a:xfrm>
-        </p:grpSpPr>
-        <p:pic>
-          <p:nvPicPr>
-            <p:cNvPr id="60" name="Picture 59"/>
-            <p:cNvPicPr>
-              <a:picLocks noChangeAspect="1"/>
-            </p:cNvPicPr>
-            <p:nvPr/>
-          </p:nvPicPr>
-          <p:blipFill>
-            <a:blip r:embed="rId4">
-              <a:extLst>
-                <a:ext uri="{28A0092B-C50C-407E-A947-70E740481C1C}">
-                  <a14:useLocalDpi xmlns:a14="http://schemas.microsoft.com/office/drawing/2010/main" val="0"/>
-                </a:ext>
-              </a:extLst>
-            </a:blip>
-            <a:stretch>
-              <a:fillRect/>
-            </a:stretch>
-          </p:blipFill>
-          <p:spPr>
-            <a:xfrm>
-              <a:off x="540182" y="3055079"/>
-              <a:ext cx="472440" cy="566928"/>
-            </a:xfrm>
-            <a:prstGeom prst="rect">
-              <a:avLst/>
-            </a:prstGeom>
-          </p:spPr>
-        </p:pic>
-        <p:sp>
-          <p:nvSpPr>
-            <p:cNvPr id="61" name="TextBox 60"/>
-            <p:cNvSpPr txBox="1">
-              <a:spLocks noChangeArrowheads="1"/>
-            </p:cNvSpPr>
-            <p:nvPr/>
-          </p:nvSpPr>
-          <p:spPr bwMode="auto">
-            <a:xfrm>
-              <a:off x="-464240" y="3661082"/>
-              <a:ext cx="2445656" cy="261610"/>
-            </a:xfrm>
-            <a:prstGeom prst="rect">
-              <a:avLst/>
-            </a:prstGeom>
-            <a:noFill/>
-          </p:spPr>
-          <p:txBody>
-            <a:bodyPr wrap="square" lIns="0" tIns="0" rIns="0" bIns="0" rtlCol="0" anchor="ctr">
-              <a:noAutofit/>
-            </a:bodyPr>
-            <a:lstStyle>
-              <a:defPPr>
-                <a:defRPr lang="en-US"/>
-              </a:defPPr>
-              <a:lvl1pPr algn="ctr">
-                <a:defRPr sz="1100">
-                  <a:solidFill>
-                    <a:schemeClr val="tx1">
-                      <a:lumMod val="95000"/>
-                    </a:schemeClr>
-                  </a:solidFill>
-                  <a:latin typeface="Amazon Ember"/>
-                  <a:ea typeface="Amazon Ember Light" charset="0"/>
-                  <a:cs typeface="Amazon Ember Light" charset="0"/>
-                </a:defRPr>
-              </a:lvl1pPr>
-            </a:lstStyle>
-            <a:p>
-              <a:r>
-                <a:rPr lang="en-US" dirty="0"/>
-                <a:t>Lambda function</a:t>
-              </a:r>
-            </a:p>
-            <a:p>
-              <a:r>
-                <a:rPr lang="en-US" i="1" dirty="0" err="1" smtClean="0"/>
-                <a:t>Compliance_Validation</a:t>
-              </a:r>
-              <a:endParaRPr lang="en-US" i="1" dirty="0"/>
-            </a:p>
-          </p:txBody>
-        </p:sp>
-      </p:grpSp>
+              <a:rPr lang="en-US" sz="1800" b="1" dirty="0"/>
+              <a:t>Application </a:t>
+            </a:r>
+            <a:r>
+              <a:rPr lang="en-US" sz="1800" b="1" dirty="0" smtClean="0"/>
+              <a:t>Account N</a:t>
+            </a:r>
+            <a:endParaRPr lang="en-US" sz="1800" b="1" dirty="0"/>
+          </a:p>
+        </p:txBody>
+      </p:sp>
       <p:pic>
         <p:nvPicPr>
-          <p:cNvPr id="65" name="Picture 64"/>
+          <p:cNvPr id="57" name="Picture 56"/>
           <p:cNvPicPr>
             <a:picLocks noChangeAspect="1"/>
           </p:cNvPicPr>
           <p:nvPr/>
         </p:nvPicPr>
         <p:blipFill>
-          <a:blip r:embed="rId5">
+          <a:blip r:embed="rId2">
             <a:extLst>
               <a:ext uri="{28A0092B-C50C-407E-A947-70E740481C1C}">
                 <a14:useLocalDpi xmlns:a14="http://schemas.microsoft.com/office/drawing/2010/main" val="0"/>
@@ -3583,24 +4320,157 @@
         </p:blipFill>
         <p:spPr>
           <a:xfrm>
-            <a:off x="6227861" y="3501189"/>
-            <a:ext cx="271146" cy="320040"/>
+            <a:off x="6964391" y="6711108"/>
+            <a:ext cx="603504" cy="393954"/>
           </a:xfrm>
           <a:prstGeom prst="rect">
             <a:avLst/>
           </a:prstGeom>
         </p:spPr>
       </p:pic>
+    </p:spTree>
+    <p:extLst>
+      <p:ext uri="{BB962C8B-B14F-4D97-AF65-F5344CB8AC3E}">
+        <p14:creationId xmlns:p14="http://schemas.microsoft.com/office/powerpoint/2010/main" val="1172120803"/>
+      </p:ext>
+    </p:extLst>
+  </p:cSld>
+  <p:clrMapOvr>
+    <a:masterClrMapping/>
+  </p:clrMapOvr>
+</p:sld>
+</file>
+
+<file path=ppt/slides/slide2.xml><?xml version="1.0" encoding="utf-8"?>
+<p:sld xmlns:a="http://schemas.openxmlformats.org/drawingml/2006/main" xmlns:r="http://schemas.openxmlformats.org/officeDocument/2006/relationships" xmlns:p="http://schemas.openxmlformats.org/presentationml/2006/main">
+  <p:cSld>
+    <p:spTree>
+      <p:nvGrpSpPr>
+        <p:cNvPr id="1" name=""/>
+        <p:cNvGrpSpPr/>
+        <p:nvPr/>
+      </p:nvGrpSpPr>
+      <p:grpSpPr>
+        <a:xfrm>
+          <a:off x="0" y="0"/>
+          <a:ext cx="0" cy="0"/>
+          <a:chOff x="0" y="0"/>
+          <a:chExt cx="0" cy="0"/>
+        </a:xfrm>
+      </p:grpSpPr>
+      <p:sp>
+        <p:nvSpPr>
+          <p:cNvPr id="4" name="Rounded Rectangle 3"/>
+          <p:cNvSpPr/>
+          <p:nvPr/>
+        </p:nvSpPr>
+        <p:spPr>
+          <a:xfrm>
+            <a:off x="782838" y="812742"/>
+            <a:ext cx="4279356" cy="5509475"/>
+          </a:xfrm>
+          <a:prstGeom prst="roundRect">
+            <a:avLst>
+              <a:gd name="adj" fmla="val 9818"/>
+            </a:avLst>
+          </a:prstGeom>
+          <a:noFill/>
+          <a:ln w="6350">
+            <a:solidFill>
+              <a:schemeClr val="tx1"/>
+            </a:solidFill>
+            <a:prstDash val="solid"/>
+          </a:ln>
+          <a:effectLst/>
+        </p:spPr>
+        <p:style>
+          <a:lnRef idx="1">
+            <a:schemeClr val="accent1"/>
+          </a:lnRef>
+          <a:fillRef idx="3">
+            <a:schemeClr val="accent1"/>
+          </a:fillRef>
+          <a:effectRef idx="2">
+            <a:schemeClr val="accent1"/>
+          </a:effectRef>
+          <a:fontRef idx="minor">
+            <a:schemeClr val="lt1"/>
+          </a:fontRef>
+        </p:style>
+        <p:txBody>
+          <a:bodyPr anchor="ctr"/>
+          <a:lstStyle/>
+          <a:p>
+            <a:pPr algn="ctr">
+              <a:defRPr/>
+            </a:pPr>
+            <a:endParaRPr lang="en-US" dirty="0">
+              <a:solidFill>
+                <a:schemeClr val="tx1"/>
+              </a:solidFill>
+              <a:latin typeface="Arial"/>
+              <a:cs typeface="Arial"/>
+            </a:endParaRPr>
+          </a:p>
+        </p:txBody>
+      </p:sp>
+      <p:sp>
+        <p:nvSpPr>
+          <p:cNvPr id="5" name="TextBox 4"/>
+          <p:cNvSpPr txBox="1">
+            <a:spLocks noChangeArrowheads="1"/>
+          </p:cNvSpPr>
+          <p:nvPr/>
+        </p:nvSpPr>
+        <p:spPr bwMode="auto">
+          <a:xfrm>
+            <a:off x="2248434" y="553341"/>
+            <a:ext cx="1837458" cy="261610"/>
+          </a:xfrm>
+          <a:prstGeom prst="rect">
+            <a:avLst/>
+          </a:prstGeom>
+          <a:noFill/>
+        </p:spPr>
+        <p:txBody>
+          <a:bodyPr wrap="square" lIns="0" tIns="0" rIns="0" bIns="0" rtlCol="0" anchor="ctr">
+            <a:noAutofit/>
+          </a:bodyPr>
+          <a:lstStyle>
+            <a:defPPr>
+              <a:defRPr lang="en-US"/>
+            </a:defPPr>
+            <a:lvl1pPr algn="ctr">
+              <a:defRPr sz="1400" b="1">
+                <a:solidFill>
+                  <a:schemeClr val="tx1">
+                    <a:lumMod val="95000"/>
+                  </a:schemeClr>
+                </a:solidFill>
+                <a:latin typeface="Amazon Ember"/>
+                <a:ea typeface="Amazon Ember Light" charset="0"/>
+                <a:cs typeface="Amazon Ember Light" charset="0"/>
+              </a:defRPr>
+            </a:lvl1pPr>
+          </a:lstStyle>
+          <a:p>
+            <a:r>
+              <a:rPr lang="en-US" dirty="0"/>
+              <a:t>Compliance Account</a:t>
+            </a:r>
+          </a:p>
+        </p:txBody>
+      </p:sp>
       <p:pic>
         <p:nvPicPr>
-          <p:cNvPr id="67" name="Picture 66"/>
+          <p:cNvPr id="6" name="Picture 5"/>
           <p:cNvPicPr>
             <a:picLocks noChangeAspect="1"/>
           </p:cNvPicPr>
           <p:nvPr/>
         </p:nvPicPr>
         <p:blipFill>
-          <a:blip r:embed="rId6">
+          <a:blip r:embed="rId2">
             <a:extLst>
               <a:ext uri="{28A0092B-C50C-407E-A947-70E740481C1C}">
                 <a14:useLocalDpi xmlns:a14="http://schemas.microsoft.com/office/drawing/2010/main" val="0"/>
@@ -3613,456 +4483,82 @@
         </p:blipFill>
         <p:spPr>
           <a:xfrm>
-            <a:off x="6571004" y="3157543"/>
-            <a:ext cx="276792" cy="320040"/>
+            <a:off x="936167" y="545703"/>
+            <a:ext cx="603504" cy="393954"/>
           </a:xfrm>
           <a:prstGeom prst="rect">
             <a:avLst/>
           </a:prstGeom>
         </p:spPr>
       </p:pic>
-      <p:pic>
-        <p:nvPicPr>
-          <p:cNvPr id="69" name="Picture 68"/>
-          <p:cNvPicPr>
-            <a:picLocks noChangeAspect="1"/>
-          </p:cNvPicPr>
-          <p:nvPr/>
-        </p:nvPicPr>
-        <p:blipFill>
-          <a:blip r:embed="rId7">
-            <a:extLst>
-              <a:ext uri="{28A0092B-C50C-407E-A947-70E740481C1C}">
-                <a14:useLocalDpi xmlns:a14="http://schemas.microsoft.com/office/drawing/2010/main" val="0"/>
-              </a:ext>
-            </a:extLst>
-          </a:blip>
-          <a:stretch>
-            <a:fillRect/>
-          </a:stretch>
-        </p:blipFill>
-        <p:spPr>
-          <a:xfrm>
-            <a:off x="6579363" y="3496234"/>
-            <a:ext cx="266700" cy="320040"/>
-          </a:xfrm>
-          <a:prstGeom prst="rect">
-            <a:avLst/>
-          </a:prstGeom>
-        </p:spPr>
-      </p:pic>
-      <p:pic>
-        <p:nvPicPr>
-          <p:cNvPr id="71" name="Picture 70"/>
-          <p:cNvPicPr>
-            <a:picLocks noChangeAspect="1"/>
-          </p:cNvPicPr>
-          <p:nvPr/>
-        </p:nvPicPr>
-        <p:blipFill>
-          <a:blip r:embed="rId8">
-            <a:extLst>
-              <a:ext uri="{28A0092B-C50C-407E-A947-70E740481C1C}">
-                <a14:useLocalDpi xmlns:a14="http://schemas.microsoft.com/office/drawing/2010/main" val="0"/>
-              </a:ext>
-            </a:extLst>
-          </a:blip>
-          <a:stretch>
-            <a:fillRect/>
-          </a:stretch>
-        </p:blipFill>
-        <p:spPr>
-          <a:xfrm>
-            <a:off x="6217793" y="3157543"/>
-            <a:ext cx="272428" cy="292608"/>
-          </a:xfrm>
-          <a:prstGeom prst="rect">
-            <a:avLst/>
-          </a:prstGeom>
-        </p:spPr>
-      </p:pic>
-      <p:sp>
-        <p:nvSpPr>
-          <p:cNvPr id="23" name="Rectangle 22"/>
+      <p:sp>
+        <p:nvSpPr>
+          <p:cNvPr id="7" name="Rounded Rectangle 6"/>
           <p:cNvSpPr/>
           <p:nvPr/>
         </p:nvSpPr>
         <p:spPr>
           <a:xfrm>
-            <a:off x="7124885" y="3262139"/>
-            <a:ext cx="3919353" cy="430887"/>
-          </a:xfrm>
-          <a:prstGeom prst="rect">
-            <a:avLst/>
-          </a:prstGeom>
-        </p:spPr>
-        <p:txBody>
-          <a:bodyPr wrap="square">
-            <a:spAutoFit/>
-          </a:bodyPr>
-          <a:lstStyle/>
-          <a:p>
-            <a:r>
-              <a:rPr lang="en-US" sz="1100" dirty="0">
-                <a:latin typeface="Amazon Ember" panose="020B0603020204020204" pitchFamily="34" charset="0"/>
-                <a:ea typeface="Amazon Ember" panose="020B0603020204020204" pitchFamily="34" charset="0"/>
-                <a:cs typeface="Amazon Ember" panose="020B0603020204020204" pitchFamily="34" charset="0"/>
-              </a:rPr>
-              <a:t>Various </a:t>
-            </a:r>
-            <a:r>
-              <a:rPr lang="en-US" sz="1100" b="1" dirty="0">
-                <a:latin typeface="Amazon Ember" panose="020B0603020204020204" pitchFamily="34" charset="0"/>
-                <a:ea typeface="Amazon Ember" panose="020B0603020204020204" pitchFamily="34" charset="0"/>
-                <a:cs typeface="Amazon Ember" panose="020B0603020204020204" pitchFamily="34" charset="0"/>
-              </a:rPr>
-              <a:t>AWS resources</a:t>
-            </a:r>
-            <a:r>
-              <a:rPr lang="en-US" sz="1100" dirty="0">
-                <a:latin typeface="Amazon Ember" panose="020B0603020204020204" pitchFamily="34" charset="0"/>
-                <a:ea typeface="Amazon Ember" panose="020B0603020204020204" pitchFamily="34" charset="0"/>
-                <a:cs typeface="Amazon Ember" panose="020B0603020204020204" pitchFamily="34" charset="0"/>
-              </a:rPr>
-              <a:t> and services are verified on the defined </a:t>
-            </a:r>
-            <a:r>
-              <a:rPr lang="en-US" sz="1100" dirty="0" smtClean="0">
-                <a:latin typeface="Amazon Ember" panose="020B0603020204020204" pitchFamily="34" charset="0"/>
-                <a:ea typeface="Amazon Ember" panose="020B0603020204020204" pitchFamily="34" charset="0"/>
-                <a:cs typeface="Amazon Ember" panose="020B0603020204020204" pitchFamily="34" charset="0"/>
-              </a:rPr>
-              <a:t>RuleSet.</a:t>
-            </a:r>
-            <a:endParaRPr lang="en-US" sz="1100" dirty="0">
-              <a:latin typeface="Amazon Ember" panose="020B0603020204020204" pitchFamily="34" charset="0"/>
-              <a:ea typeface="Amazon Ember" panose="020B0603020204020204" pitchFamily="34" charset="0"/>
-              <a:cs typeface="Amazon Ember" panose="020B0603020204020204" pitchFamily="34" charset="0"/>
-            </a:endParaRPr>
-          </a:p>
-        </p:txBody>
-      </p:sp>
-      <p:sp>
-        <p:nvSpPr>
-          <p:cNvPr id="24" name="Rectangle 23"/>
-          <p:cNvSpPr/>
-          <p:nvPr/>
-        </p:nvSpPr>
-        <p:spPr>
-          <a:xfrm>
-            <a:off x="7116628" y="1142333"/>
-            <a:ext cx="3383805" cy="600164"/>
-          </a:xfrm>
-          <a:prstGeom prst="rect">
-            <a:avLst/>
-          </a:prstGeom>
-        </p:spPr>
-        <p:txBody>
-          <a:bodyPr wrap="square">
-            <a:spAutoFit/>
-          </a:bodyPr>
-          <a:lstStyle/>
-          <a:p>
-            <a:r>
-              <a:rPr lang="en-US" sz="1100" b="1" dirty="0">
-                <a:latin typeface="Amazon Ember" panose="020B0603020204020204" pitchFamily="34" charset="0"/>
-                <a:ea typeface="Amazon Ember" panose="020B0603020204020204" pitchFamily="34" charset="0"/>
-                <a:cs typeface="Amazon Ember" panose="020B0603020204020204" pitchFamily="34" charset="0"/>
-              </a:rPr>
-              <a:t>AWS Config</a:t>
-            </a:r>
-            <a:r>
-              <a:rPr lang="en-US" sz="1100" dirty="0">
-                <a:latin typeface="Amazon Ember" panose="020B0603020204020204" pitchFamily="34" charset="0"/>
-                <a:ea typeface="Amazon Ember" panose="020B0603020204020204" pitchFamily="34" charset="0"/>
-                <a:cs typeface="Amazon Ember" panose="020B0603020204020204" pitchFamily="34" charset="0"/>
-              </a:rPr>
-              <a:t> records configurations. </a:t>
-            </a:r>
-            <a:r>
-              <a:rPr lang="en-US" sz="1100" dirty="0" smtClean="0">
-                <a:latin typeface="Amazon Ember" panose="020B0603020204020204" pitchFamily="34" charset="0"/>
-                <a:ea typeface="Amazon Ember" panose="020B0603020204020204" pitchFamily="34" charset="0"/>
-                <a:cs typeface="Amazon Ember" panose="020B0603020204020204" pitchFamily="34" charset="0"/>
-              </a:rPr>
-              <a:t>Change of configuration </a:t>
-            </a:r>
-            <a:r>
-              <a:rPr lang="en-US" sz="1100" dirty="0">
-                <a:latin typeface="Amazon Ember" panose="020B0603020204020204" pitchFamily="34" charset="0"/>
-                <a:ea typeface="Amazon Ember" panose="020B0603020204020204" pitchFamily="34" charset="0"/>
-                <a:cs typeface="Amazon Ember" panose="020B0603020204020204" pitchFamily="34" charset="0"/>
-              </a:rPr>
-              <a:t>triggers appropriate Rule(s) to verify the compliance of the new configuration.</a:t>
-            </a:r>
-          </a:p>
-        </p:txBody>
-      </p:sp>
-      <p:sp>
-        <p:nvSpPr>
-          <p:cNvPr id="72" name="Rectangle 71"/>
-          <p:cNvSpPr/>
-          <p:nvPr/>
-        </p:nvSpPr>
-        <p:spPr>
-          <a:xfrm>
-            <a:off x="7116628" y="4154912"/>
-            <a:ext cx="3788855" cy="430887"/>
-          </a:xfrm>
-          <a:prstGeom prst="rect">
-            <a:avLst/>
-          </a:prstGeom>
-        </p:spPr>
-        <p:txBody>
-          <a:bodyPr wrap="square">
-            <a:spAutoFit/>
-          </a:bodyPr>
-          <a:lstStyle/>
-          <a:p>
-            <a:r>
-              <a:rPr lang="en-US" sz="1100" dirty="0" smtClean="0">
-                <a:latin typeface="Amazon Ember" panose="020B0603020204020204" pitchFamily="34" charset="0"/>
-                <a:ea typeface="Amazon Ember" panose="020B0603020204020204" pitchFamily="34" charset="0"/>
-                <a:cs typeface="Amazon Ember" panose="020B0603020204020204" pitchFamily="34" charset="0"/>
-              </a:rPr>
-              <a:t>The results of </a:t>
-            </a:r>
-            <a:r>
-              <a:rPr lang="en-US" sz="1100" dirty="0">
-                <a:latin typeface="Amazon Ember" panose="020B0603020204020204" pitchFamily="34" charset="0"/>
-                <a:ea typeface="Amazon Ember" panose="020B0603020204020204" pitchFamily="34" charset="0"/>
-                <a:cs typeface="Amazon Ember" panose="020B0603020204020204" pitchFamily="34" charset="0"/>
-              </a:rPr>
-              <a:t>compliance and non-compliance are displayed on the </a:t>
-            </a:r>
-            <a:r>
-              <a:rPr lang="en-US" sz="1100" b="1" dirty="0">
-                <a:latin typeface="Amazon Ember" panose="020B0603020204020204" pitchFamily="34" charset="0"/>
-                <a:ea typeface="Amazon Ember" panose="020B0603020204020204" pitchFamily="34" charset="0"/>
-                <a:cs typeface="Amazon Ember" panose="020B0603020204020204" pitchFamily="34" charset="0"/>
-              </a:rPr>
-              <a:t>Config </a:t>
-            </a:r>
-            <a:r>
-              <a:rPr lang="en-US" sz="1100" b="1" dirty="0" smtClean="0">
-                <a:latin typeface="Amazon Ember" panose="020B0603020204020204" pitchFamily="34" charset="0"/>
-                <a:ea typeface="Amazon Ember" panose="020B0603020204020204" pitchFamily="34" charset="0"/>
-                <a:cs typeface="Amazon Ember" panose="020B0603020204020204" pitchFamily="34" charset="0"/>
-              </a:rPr>
-              <a:t>Dashboard.</a:t>
-            </a:r>
-            <a:endParaRPr lang="en-US" sz="1100" dirty="0">
-              <a:latin typeface="Amazon Ember" panose="020B0603020204020204" pitchFamily="34" charset="0"/>
-              <a:ea typeface="Amazon Ember" panose="020B0603020204020204" pitchFamily="34" charset="0"/>
-              <a:cs typeface="Amazon Ember" panose="020B0603020204020204" pitchFamily="34" charset="0"/>
-            </a:endParaRPr>
-          </a:p>
-        </p:txBody>
-      </p:sp>
-      <p:pic>
-        <p:nvPicPr>
-          <p:cNvPr id="74" name="Picture 73"/>
-          <p:cNvPicPr>
-            <a:picLocks noChangeAspect="1"/>
-          </p:cNvPicPr>
-          <p:nvPr/>
-        </p:nvPicPr>
-        <p:blipFill>
-          <a:blip r:embed="rId3">
-            <a:extLst>
-              <a:ext uri="{28A0092B-C50C-407E-A947-70E740481C1C}">
-                <a14:useLocalDpi xmlns:a14="http://schemas.microsoft.com/office/drawing/2010/main" val="0"/>
-              </a:ext>
-            </a:extLst>
-          </a:blip>
-          <a:stretch>
-            <a:fillRect/>
-          </a:stretch>
-        </p:blipFill>
-        <p:spPr>
-          <a:xfrm>
-            <a:off x="6287497" y="4020268"/>
-            <a:ext cx="475280" cy="570338"/>
-          </a:xfrm>
-          <a:prstGeom prst="rect">
-            <a:avLst/>
-          </a:prstGeom>
-        </p:spPr>
-      </p:pic>
-      <p:pic>
-        <p:nvPicPr>
-          <p:cNvPr id="73" name="Picture 72"/>
-          <p:cNvPicPr>
-            <a:picLocks noChangeAspect="1"/>
-          </p:cNvPicPr>
-          <p:nvPr/>
-        </p:nvPicPr>
-        <p:blipFill>
-          <a:blip r:embed="rId9">
-            <a:extLst>
-              <a:ext uri="{28A0092B-C50C-407E-A947-70E740481C1C}">
-                <a14:useLocalDpi xmlns:a14="http://schemas.microsoft.com/office/drawing/2010/main" val="0"/>
-              </a:ext>
-            </a:extLst>
-          </a:blip>
-          <a:stretch>
-            <a:fillRect/>
-          </a:stretch>
-        </p:blipFill>
-        <p:spPr>
-          <a:xfrm>
-            <a:off x="6607253" y="4285716"/>
-            <a:ext cx="318346" cy="439622"/>
-          </a:xfrm>
-          <a:prstGeom prst="rect">
-            <a:avLst/>
-          </a:prstGeom>
-        </p:spPr>
-      </p:pic>
-      <p:sp>
-        <p:nvSpPr>
-          <p:cNvPr id="75" name="Rectangle 74"/>
-          <p:cNvSpPr/>
-          <p:nvPr/>
-        </p:nvSpPr>
-        <p:spPr>
-          <a:xfrm>
-            <a:off x="2578811" y="1113329"/>
-            <a:ext cx="2223277" cy="769441"/>
-          </a:xfrm>
-          <a:prstGeom prst="rect">
-            <a:avLst/>
-          </a:prstGeom>
-        </p:spPr>
-        <p:txBody>
-          <a:bodyPr wrap="square">
-            <a:spAutoFit/>
-          </a:bodyPr>
-          <a:lstStyle/>
-          <a:p>
-            <a:r>
-              <a:rPr lang="en-US" sz="1100" dirty="0">
-                <a:latin typeface="Amazon Ember" panose="020B0603020204020204" pitchFamily="34" charset="0"/>
-                <a:ea typeface="Amazon Ember" panose="020B0603020204020204" pitchFamily="34" charset="0"/>
-                <a:cs typeface="Amazon Ember" panose="020B0603020204020204" pitchFamily="34" charset="0"/>
-              </a:rPr>
-              <a:t>The code of </a:t>
-            </a:r>
-            <a:r>
-              <a:rPr lang="en-US" sz="1100" dirty="0" smtClean="0">
-                <a:latin typeface="Amazon Ember" panose="020B0603020204020204" pitchFamily="34" charset="0"/>
-                <a:ea typeface="Amazon Ember" panose="020B0603020204020204" pitchFamily="34" charset="0"/>
-                <a:cs typeface="Amazon Ember" panose="020B0603020204020204" pitchFamily="34" charset="0"/>
-              </a:rPr>
-              <a:t>each Rule is located </a:t>
-            </a:r>
-            <a:r>
-              <a:rPr lang="en-US" sz="1100" dirty="0">
-                <a:latin typeface="Amazon Ember" panose="020B0603020204020204" pitchFamily="34" charset="0"/>
-                <a:ea typeface="Amazon Ember" panose="020B0603020204020204" pitchFamily="34" charset="0"/>
-                <a:cs typeface="Amazon Ember" panose="020B0603020204020204" pitchFamily="34" charset="0"/>
-              </a:rPr>
-              <a:t>in AWS Lambda functions to protect the code base from </a:t>
-            </a:r>
-            <a:r>
-              <a:rPr lang="en-US" sz="1100" dirty="0" smtClean="0">
-                <a:latin typeface="Amazon Ember" panose="020B0603020204020204" pitchFamily="34" charset="0"/>
-                <a:ea typeface="Amazon Ember" panose="020B0603020204020204" pitchFamily="34" charset="0"/>
-                <a:cs typeface="Amazon Ember" panose="020B0603020204020204" pitchFamily="34" charset="0"/>
-              </a:rPr>
-              <a:t>tempering.</a:t>
-            </a:r>
-            <a:endParaRPr lang="en-US" sz="1100" dirty="0">
-              <a:latin typeface="Amazon Ember" panose="020B0603020204020204" pitchFamily="34" charset="0"/>
-              <a:ea typeface="Amazon Ember" panose="020B0603020204020204" pitchFamily="34" charset="0"/>
-              <a:cs typeface="Amazon Ember" panose="020B0603020204020204" pitchFamily="34" charset="0"/>
-            </a:endParaRPr>
-          </a:p>
-        </p:txBody>
-      </p:sp>
-      <p:sp>
-        <p:nvSpPr>
-          <p:cNvPr id="76" name="Rectangle 75"/>
-          <p:cNvSpPr/>
-          <p:nvPr/>
-        </p:nvSpPr>
-        <p:spPr>
-          <a:xfrm>
-            <a:off x="2578811" y="2394071"/>
-            <a:ext cx="2290863" cy="600164"/>
-          </a:xfrm>
-          <a:prstGeom prst="rect">
-            <a:avLst/>
-          </a:prstGeom>
-        </p:spPr>
-        <p:txBody>
-          <a:bodyPr wrap="square">
-            <a:spAutoFit/>
-          </a:bodyPr>
-          <a:lstStyle/>
-          <a:p>
-            <a:r>
-              <a:rPr lang="en-US" sz="1100" dirty="0" smtClean="0">
-                <a:latin typeface="Amazon Ember" panose="020B0603020204020204" pitchFamily="34" charset="0"/>
-                <a:ea typeface="Amazon Ember" panose="020B0603020204020204" pitchFamily="34" charset="0"/>
-                <a:cs typeface="Amazon Ember" panose="020B0603020204020204" pitchFamily="34" charset="0"/>
-              </a:rPr>
-              <a:t>One rule reports regularly the </a:t>
-            </a:r>
-            <a:r>
-              <a:rPr lang="en-US" sz="1100" dirty="0">
-                <a:latin typeface="Amazon Ember" panose="020B0603020204020204" pitchFamily="34" charset="0"/>
-                <a:ea typeface="Amazon Ember" panose="020B0603020204020204" pitchFamily="34" charset="0"/>
-                <a:cs typeface="Amazon Ember" panose="020B0603020204020204" pitchFamily="34" charset="0"/>
-              </a:rPr>
-              <a:t>compliance status of all Rules evaluations.</a:t>
-            </a:r>
-          </a:p>
-        </p:txBody>
-      </p:sp>
-      <p:cxnSp>
-        <p:nvCxnSpPr>
-          <p:cNvPr id="79" name="Straight Arrow Connector 78"/>
-          <p:cNvCxnSpPr/>
-          <p:nvPr/>
-        </p:nvCxnSpPr>
-        <p:spPr>
-          <a:xfrm>
-            <a:off x="1555688" y="3629735"/>
-            <a:ext cx="471218" cy="0"/>
-          </a:xfrm>
-          <a:prstGeom prst="straightConnector1">
-            <a:avLst/>
-          </a:prstGeom>
-          <a:ln w="38100">
-            <a:tailEnd type="triangle"/>
+            <a:off x="5535313" y="812741"/>
+            <a:ext cx="5370170" cy="4547792"/>
+          </a:xfrm>
+          <a:prstGeom prst="roundRect">
+            <a:avLst>
+              <a:gd name="adj" fmla="val 9818"/>
+            </a:avLst>
+          </a:prstGeom>
+          <a:noFill/>
+          <a:ln w="6350">
+            <a:solidFill>
+              <a:schemeClr val="tx1"/>
+            </a:solidFill>
+            <a:prstDash val="solid"/>
           </a:ln>
+          <a:effectLst/>
         </p:spPr>
         <p:style>
           <a:lnRef idx="1">
             <a:schemeClr val="accent1"/>
           </a:lnRef>
-          <a:fillRef idx="0">
+          <a:fillRef idx="3">
             <a:schemeClr val="accent1"/>
           </a:fillRef>
-          <a:effectRef idx="0">
+          <a:effectRef idx="2">
             <a:schemeClr val="accent1"/>
           </a:effectRef>
           <a:fontRef idx="minor">
-            <a:schemeClr val="tx1"/>
+            <a:schemeClr val="lt1"/>
           </a:fontRef>
         </p:style>
-      </p:cxnSp>
-      <p:sp>
-        <p:nvSpPr>
-          <p:cNvPr id="81" name="TextBox 80"/>
-          <p:cNvSpPr txBox="1"/>
-          <p:nvPr/>
-        </p:nvSpPr>
-        <p:spPr>
-          <a:xfrm>
-            <a:off x="5863569" y="4687373"/>
-            <a:ext cx="1312588" cy="261610"/>
+        <p:txBody>
+          <a:bodyPr anchor="ctr"/>
+          <a:lstStyle/>
+          <a:p>
+            <a:pPr algn="ctr">
+              <a:defRPr/>
+            </a:pPr>
+            <a:endParaRPr lang="en-US" dirty="0">
+              <a:solidFill>
+                <a:schemeClr val="tx1"/>
+              </a:solidFill>
+              <a:latin typeface="Arial"/>
+              <a:cs typeface="Arial"/>
+            </a:endParaRPr>
+          </a:p>
+        </p:txBody>
+      </p:sp>
+      <p:sp>
+        <p:nvSpPr>
+          <p:cNvPr id="8" name="TextBox 7"/>
+          <p:cNvSpPr txBox="1">
+            <a:spLocks noChangeArrowheads="1"/>
+          </p:cNvSpPr>
+          <p:nvPr/>
+        </p:nvSpPr>
+        <p:spPr bwMode="auto">
+          <a:xfrm>
+            <a:off x="6925599" y="552949"/>
+            <a:ext cx="2778790" cy="261610"/>
           </a:xfrm>
           <a:prstGeom prst="rect">
             <a:avLst/>
@@ -4092,22 +4588,22 @@
           </a:lstStyle>
           <a:p>
             <a:r>
-              <a:rPr lang="en-US" dirty="0"/>
-              <a:t>Config Dashboard</a:t>
+              <a:rPr lang="en-US" sz="1400" b="1" dirty="0"/>
+              <a:t>Application Account(s)</a:t>
             </a:r>
           </a:p>
         </p:txBody>
       </p:sp>
       <p:pic>
         <p:nvPicPr>
-          <p:cNvPr id="82" name="Picture 81"/>
+          <p:cNvPr id="9" name="Picture 8"/>
           <p:cNvPicPr>
             <a:picLocks noChangeAspect="1"/>
           </p:cNvPicPr>
           <p:nvPr/>
         </p:nvPicPr>
         <p:blipFill>
-          <a:blip r:embed="rId10">
+          <a:blip r:embed="rId2">
             <a:extLst>
               <a:ext uri="{28A0092B-C50C-407E-A947-70E740481C1C}">
                 <a14:useLocalDpi xmlns:a14="http://schemas.microsoft.com/office/drawing/2010/main" val="0"/>
@@ -4120,8 +4616,8 @@
         </p:blipFill>
         <p:spPr>
           <a:xfrm>
-            <a:off x="6354007" y="2125544"/>
-            <a:ext cx="335702" cy="636068"/>
+            <a:off x="5711226" y="545703"/>
+            <a:ext cx="603504" cy="393954"/>
           </a:xfrm>
           <a:prstGeom prst="rect">
             <a:avLst/>
@@ -4130,144 +4626,14 @@
       </p:pic>
       <p:sp>
         <p:nvSpPr>
-          <p:cNvPr id="83" name="Rectangle 82"/>
-          <p:cNvSpPr/>
-          <p:nvPr/>
-        </p:nvSpPr>
-        <p:spPr>
-          <a:xfrm>
-            <a:off x="3141498" y="3340110"/>
-            <a:ext cx="1805502" cy="577081"/>
-          </a:xfrm>
-          <a:prstGeom prst="rect">
-            <a:avLst/>
-          </a:prstGeom>
-        </p:spPr>
-        <p:txBody>
-          <a:bodyPr wrap="square">
-            <a:spAutoFit/>
-          </a:bodyPr>
-          <a:lstStyle/>
-          <a:p>
-            <a:r>
-              <a:rPr lang="en-US" sz="1050" b="1" dirty="0" smtClean="0">
-                <a:latin typeface="Amazon Ember" panose="020B0603020204020204" pitchFamily="34" charset="0"/>
-                <a:ea typeface="Amazon Ember" panose="020B0603020204020204" pitchFamily="34" charset="0"/>
-                <a:cs typeface="Amazon Ember" panose="020B0603020204020204" pitchFamily="34" charset="0"/>
-              </a:rPr>
-              <a:t>Aggregate</a:t>
-            </a:r>
-            <a:r>
-              <a:rPr lang="en-US" sz="1050" dirty="0" smtClean="0">
-                <a:latin typeface="Amazon Ember" panose="020B0603020204020204" pitchFamily="34" charset="0"/>
-                <a:ea typeface="Amazon Ember" panose="020B0603020204020204" pitchFamily="34" charset="0"/>
-                <a:cs typeface="Amazon Ember" panose="020B0603020204020204" pitchFamily="34" charset="0"/>
-              </a:rPr>
-              <a:t> the </a:t>
-            </a:r>
-            <a:r>
-              <a:rPr lang="en-US" sz="1050" dirty="0">
-                <a:latin typeface="Amazon Ember" panose="020B0603020204020204" pitchFamily="34" charset="0"/>
-                <a:ea typeface="Amazon Ember" panose="020B0603020204020204" pitchFamily="34" charset="0"/>
-                <a:cs typeface="Amazon Ember" panose="020B0603020204020204" pitchFamily="34" charset="0"/>
-              </a:rPr>
-              <a:t>streaming </a:t>
-            </a:r>
-            <a:r>
-              <a:rPr lang="en-US" sz="1050" dirty="0" smtClean="0">
-                <a:latin typeface="Amazon Ember" panose="020B0603020204020204" pitchFamily="34" charset="0"/>
-                <a:ea typeface="Amazon Ember" panose="020B0603020204020204" pitchFamily="34" charset="0"/>
-                <a:cs typeface="Amazon Ember" panose="020B0603020204020204" pitchFamily="34" charset="0"/>
-              </a:rPr>
-              <a:t>compliance events before delivery to S3.</a:t>
-            </a:r>
-            <a:endParaRPr lang="en-US" sz="1050" dirty="0">
-              <a:latin typeface="Amazon Ember" panose="020B0603020204020204" pitchFamily="34" charset="0"/>
-              <a:ea typeface="Amazon Ember" panose="020B0603020204020204" pitchFamily="34" charset="0"/>
-              <a:cs typeface="Amazon Ember" panose="020B0603020204020204" pitchFamily="34" charset="0"/>
-            </a:endParaRPr>
-          </a:p>
-        </p:txBody>
-      </p:sp>
-      <p:sp>
-        <p:nvSpPr>
-          <p:cNvPr id="84" name="Rectangle 83"/>
-          <p:cNvSpPr/>
-          <p:nvPr/>
-        </p:nvSpPr>
-        <p:spPr>
-          <a:xfrm>
-            <a:off x="3141498" y="4477932"/>
-            <a:ext cx="1920696" cy="415498"/>
-          </a:xfrm>
-          <a:prstGeom prst="rect">
-            <a:avLst/>
-          </a:prstGeom>
-        </p:spPr>
-        <p:txBody>
-          <a:bodyPr wrap="square">
-            <a:spAutoFit/>
-          </a:bodyPr>
-          <a:lstStyle/>
-          <a:p>
-            <a:r>
-              <a:rPr lang="en-US" sz="1050" b="1" dirty="0" smtClean="0">
-                <a:latin typeface="Amazon Ember" panose="020B0603020204020204" pitchFamily="34" charset="0"/>
-                <a:ea typeface="Amazon Ember" panose="020B0603020204020204" pitchFamily="34" charset="0"/>
-                <a:cs typeface="Amazon Ember" panose="020B0603020204020204" pitchFamily="34" charset="0"/>
-              </a:rPr>
-              <a:t>Store all </a:t>
-            </a:r>
-            <a:r>
-              <a:rPr lang="en-US" sz="1050" b="1" dirty="0">
-                <a:latin typeface="Amazon Ember" panose="020B0603020204020204" pitchFamily="34" charset="0"/>
-                <a:ea typeface="Amazon Ember" panose="020B0603020204020204" pitchFamily="34" charset="0"/>
-                <a:cs typeface="Amazon Ember" panose="020B0603020204020204" pitchFamily="34" charset="0"/>
-              </a:rPr>
-              <a:t>compliance </a:t>
-            </a:r>
-            <a:r>
-              <a:rPr lang="en-US" sz="1050" b="1" dirty="0" smtClean="0">
-                <a:latin typeface="Amazon Ember" panose="020B0603020204020204" pitchFamily="34" charset="0"/>
-                <a:ea typeface="Amazon Ember" panose="020B0603020204020204" pitchFamily="34" charset="0"/>
-                <a:cs typeface="Amazon Ember" panose="020B0603020204020204" pitchFamily="34" charset="0"/>
-              </a:rPr>
-              <a:t>events </a:t>
-            </a:r>
-            <a:r>
-              <a:rPr lang="en-US" sz="1050" dirty="0">
-                <a:latin typeface="Amazon Ember" panose="020B0603020204020204" pitchFamily="34" charset="0"/>
-                <a:ea typeface="Amazon Ember" panose="020B0603020204020204" pitchFamily="34" charset="0"/>
-                <a:cs typeface="Amazon Ember" panose="020B0603020204020204" pitchFamily="34" charset="0"/>
-              </a:rPr>
-              <a:t>of all resources over </a:t>
-            </a:r>
-            <a:r>
-              <a:rPr lang="en-US" sz="1050" dirty="0" smtClean="0">
-                <a:latin typeface="Amazon Ember" panose="020B0603020204020204" pitchFamily="34" charset="0"/>
-                <a:ea typeface="Amazon Ember" panose="020B0603020204020204" pitchFamily="34" charset="0"/>
-                <a:cs typeface="Amazon Ember" panose="020B0603020204020204" pitchFamily="34" charset="0"/>
-              </a:rPr>
-              <a:t>time.</a:t>
-            </a:r>
-            <a:endParaRPr lang="en-US" sz="1050" dirty="0">
-              <a:latin typeface="Amazon Ember" panose="020B0603020204020204" pitchFamily="34" charset="0"/>
-              <a:ea typeface="Amazon Ember" panose="020B0603020204020204" pitchFamily="34" charset="0"/>
-              <a:cs typeface="Amazon Ember" panose="020B0603020204020204" pitchFamily="34" charset="0"/>
-            </a:endParaRPr>
-          </a:p>
-        </p:txBody>
-      </p:sp>
-      <p:sp>
-        <p:nvSpPr>
-          <p:cNvPr id="85" name="TextBox 84"/>
+          <p:cNvPr id="46" name="TextBox 45"/>
           <p:cNvSpPr txBox="1"/>
           <p:nvPr/>
         </p:nvSpPr>
         <p:spPr>
           <a:xfrm>
-            <a:off x="5863569" y="2768393"/>
-            <a:ext cx="1312588" cy="261610"/>
+            <a:off x="6026781" y="1740747"/>
+            <a:ext cx="986167" cy="261610"/>
           </a:xfrm>
           <a:prstGeom prst="rect">
             <a:avLst/>
@@ -4298,160 +4664,51 @@
           <a:p>
             <a:r>
               <a:rPr lang="en-US" dirty="0"/>
-              <a:t>IAM Role</a:t>
-            </a:r>
-          </a:p>
-        </p:txBody>
-      </p:sp>
-      <p:sp>
-        <p:nvSpPr>
-          <p:cNvPr id="86" name="Rectangle 85"/>
-          <p:cNvSpPr/>
-          <p:nvPr/>
-        </p:nvSpPr>
-        <p:spPr>
-          <a:xfrm>
-            <a:off x="7116627" y="2143496"/>
-            <a:ext cx="3785136" cy="600164"/>
+              <a:t>Config Rules</a:t>
+            </a:r>
+          </a:p>
+        </p:txBody>
+      </p:sp>
+      <p:pic>
+        <p:nvPicPr>
+          <p:cNvPr id="39" name="Picture 38"/>
+          <p:cNvPicPr>
+            <a:picLocks noChangeAspect="1"/>
+          </p:cNvPicPr>
+          <p:nvPr/>
+        </p:nvPicPr>
+        <p:blipFill>
+          <a:blip r:embed="rId3">
+            <a:extLst>
+              <a:ext uri="{28A0092B-C50C-407E-A947-70E740481C1C}">
+                <a14:useLocalDpi xmlns:a14="http://schemas.microsoft.com/office/drawing/2010/main" val="0"/>
+              </a:ext>
+            </a:extLst>
+          </a:blip>
+          <a:stretch>
+            <a:fillRect/>
+          </a:stretch>
+        </p:blipFill>
+        <p:spPr>
+          <a:xfrm>
+            <a:off x="6282223" y="1153549"/>
+            <a:ext cx="475280" cy="570338"/>
           </a:xfrm>
           <a:prstGeom prst="rect">
             <a:avLst/>
           </a:prstGeom>
         </p:spPr>
-        <p:txBody>
-          <a:bodyPr wrap="square">
-            <a:spAutoFit/>
-          </a:bodyPr>
-          <a:lstStyle/>
-          <a:p>
-            <a:r>
-              <a:rPr lang="en-US" sz="1100" b="1" dirty="0">
-                <a:latin typeface="Amazon Ember" panose="020B0603020204020204" pitchFamily="34" charset="0"/>
-                <a:ea typeface="Amazon Ember" panose="020B0603020204020204" pitchFamily="34" charset="0"/>
-                <a:cs typeface="Amazon Ember" panose="020B0603020204020204" pitchFamily="34" charset="0"/>
-              </a:rPr>
-              <a:t>AWS IAM </a:t>
-            </a:r>
-            <a:r>
-              <a:rPr lang="en-US" sz="1100" dirty="0">
-                <a:latin typeface="Amazon Ember" panose="020B0603020204020204" pitchFamily="34" charset="0"/>
-                <a:ea typeface="Amazon Ember" panose="020B0603020204020204" pitchFamily="34" charset="0"/>
-                <a:cs typeface="Amazon Ember" panose="020B0603020204020204" pitchFamily="34" charset="0"/>
-              </a:rPr>
-              <a:t>provides short-lived credentials to the lambda functions with the permissions to read the configuration, and react if necessary.</a:t>
-            </a:r>
-          </a:p>
-        </p:txBody>
-      </p:sp>
-      <p:cxnSp>
-        <p:nvCxnSpPr>
-          <p:cNvPr id="87" name="Straight Arrow Connector 86"/>
-          <p:cNvCxnSpPr/>
-          <p:nvPr/>
-        </p:nvCxnSpPr>
-        <p:spPr>
-          <a:xfrm flipH="1">
-            <a:off x="4790784" y="1457341"/>
-            <a:ext cx="1363895" cy="0"/>
-          </a:xfrm>
-          <a:prstGeom prst="straightConnector1">
-            <a:avLst/>
-          </a:prstGeom>
-          <a:ln w="38100">
-            <a:tailEnd type="triangle"/>
-          </a:ln>
-        </p:spPr>
-        <p:style>
-          <a:lnRef idx="1">
-            <a:schemeClr val="accent1"/>
-          </a:lnRef>
-          <a:fillRef idx="0">
-            <a:schemeClr val="accent1"/>
-          </a:fillRef>
-          <a:effectRef idx="0">
-            <a:schemeClr val="accent1"/>
-          </a:effectRef>
-          <a:fontRef idx="minor">
-            <a:schemeClr val="tx1"/>
-          </a:fontRef>
-        </p:style>
-      </p:cxnSp>
-      <p:cxnSp>
-        <p:nvCxnSpPr>
-          <p:cNvPr id="90" name="Straight Arrow Connector 89"/>
-          <p:cNvCxnSpPr/>
-          <p:nvPr/>
-        </p:nvCxnSpPr>
-        <p:spPr>
-          <a:xfrm>
-            <a:off x="4460121" y="1781340"/>
-            <a:ext cx="1626531" cy="703763"/>
-          </a:xfrm>
-          <a:prstGeom prst="straightConnector1">
-            <a:avLst/>
-          </a:prstGeom>
-          <a:ln w="38100">
-            <a:tailEnd type="triangle"/>
-          </a:ln>
-        </p:spPr>
-        <p:style>
-          <a:lnRef idx="1">
-            <a:schemeClr val="accent1"/>
-          </a:lnRef>
-          <a:fillRef idx="0">
-            <a:schemeClr val="accent1"/>
-          </a:fillRef>
-          <a:effectRef idx="0">
-            <a:schemeClr val="accent1"/>
-          </a:effectRef>
-          <a:fontRef idx="minor">
-            <a:schemeClr val="tx1"/>
-          </a:fontRef>
-        </p:style>
-      </p:cxnSp>
-      <p:cxnSp>
-        <p:nvCxnSpPr>
-          <p:cNvPr id="93" name="Straight Arrow Connector 92"/>
-          <p:cNvCxnSpPr/>
-          <p:nvPr/>
-        </p:nvCxnSpPr>
-        <p:spPr>
-          <a:xfrm>
-            <a:off x="4780345" y="2775961"/>
-            <a:ext cx="1286459" cy="1529476"/>
-          </a:xfrm>
-          <a:prstGeom prst="straightConnector1">
-            <a:avLst/>
-          </a:prstGeom>
-          <a:ln w="38100">
-            <a:tailEnd type="triangle"/>
-          </a:ln>
-        </p:spPr>
-        <p:style>
-          <a:lnRef idx="1">
-            <a:schemeClr val="accent1"/>
-          </a:lnRef>
-          <a:fillRef idx="0">
-            <a:schemeClr val="accent1"/>
-          </a:fillRef>
-          <a:effectRef idx="0">
-            <a:schemeClr val="accent1"/>
-          </a:effectRef>
-          <a:fontRef idx="minor">
-            <a:schemeClr val="tx1"/>
-          </a:fontRef>
-        </p:style>
-      </p:cxnSp>
-      <p:sp>
-        <p:nvSpPr>
-          <p:cNvPr id="98" name="TextBox 97"/>
+      </p:pic>
+      <p:sp>
+        <p:nvSpPr>
+          <p:cNvPr id="47" name="TextBox 46"/>
           <p:cNvSpPr txBox="1"/>
           <p:nvPr/>
         </p:nvSpPr>
         <p:spPr>
           <a:xfrm>
-            <a:off x="2214091" y="5980317"/>
-            <a:ext cx="512102" cy="220341"/>
+            <a:off x="1648348" y="3876126"/>
+            <a:ext cx="1849231" cy="430887"/>
           </a:xfrm>
           <a:prstGeom prst="rect">
             <a:avLst/>
@@ -4481,6 +4738,1078 @@
           </a:lstStyle>
           <a:p>
             <a:r>
+              <a:rPr lang="en-US" dirty="0" smtClean="0"/>
+              <a:t>Kinesis Firehose</a:t>
+            </a:r>
+            <a:endParaRPr lang="en-US" dirty="0"/>
+          </a:p>
+          <a:p>
+            <a:r>
+              <a:rPr lang="en-US" i="1" dirty="0"/>
+              <a:t>Firehose-Compliance-as-code</a:t>
+            </a:r>
+          </a:p>
+        </p:txBody>
+      </p:sp>
+      <p:sp>
+        <p:nvSpPr>
+          <p:cNvPr id="50" name="TextBox 49"/>
+          <p:cNvSpPr txBox="1">
+            <a:spLocks noChangeArrowheads="1"/>
+          </p:cNvSpPr>
+          <p:nvPr/>
+        </p:nvSpPr>
+        <p:spPr bwMode="auto">
+          <a:xfrm>
+            <a:off x="983542" y="1850407"/>
+            <a:ext cx="1837458" cy="261610"/>
+          </a:xfrm>
+          <a:prstGeom prst="rect">
+            <a:avLst/>
+          </a:prstGeom>
+          <a:noFill/>
+        </p:spPr>
+        <p:txBody>
+          <a:bodyPr wrap="square" lIns="0" tIns="0" rIns="0" bIns="0" rtlCol="0" anchor="ctr">
+            <a:noAutofit/>
+          </a:bodyPr>
+          <a:lstStyle>
+            <a:defPPr>
+              <a:defRPr lang="en-US"/>
+            </a:defPPr>
+            <a:lvl1pPr algn="ctr">
+              <a:defRPr sz="1100">
+                <a:solidFill>
+                  <a:schemeClr val="tx1">
+                    <a:lumMod val="95000"/>
+                  </a:schemeClr>
+                </a:solidFill>
+                <a:latin typeface="Amazon Ember"/>
+                <a:ea typeface="Amazon Ember Light" charset="0"/>
+                <a:cs typeface="Amazon Ember Light" charset="0"/>
+              </a:defRPr>
+            </a:lvl1pPr>
+          </a:lstStyle>
+          <a:p>
+            <a:r>
+              <a:rPr lang="en-US" dirty="0"/>
+              <a:t>Lambda functions</a:t>
+            </a:r>
+          </a:p>
+          <a:p>
+            <a:r>
+              <a:rPr lang="en-US" dirty="0"/>
+              <a:t> (Custom Rules)</a:t>
+            </a:r>
+          </a:p>
+        </p:txBody>
+      </p:sp>
+      <p:sp>
+        <p:nvSpPr>
+          <p:cNvPr id="61" name="TextBox 60"/>
+          <p:cNvSpPr txBox="1">
+            <a:spLocks noChangeArrowheads="1"/>
+          </p:cNvSpPr>
+          <p:nvPr/>
+        </p:nvSpPr>
+        <p:spPr bwMode="auto">
+          <a:xfrm>
+            <a:off x="675031" y="2926081"/>
+            <a:ext cx="2445656" cy="261610"/>
+          </a:xfrm>
+          <a:prstGeom prst="rect">
+            <a:avLst/>
+          </a:prstGeom>
+          <a:noFill/>
+        </p:spPr>
+        <p:txBody>
+          <a:bodyPr wrap="square" lIns="0" tIns="0" rIns="0" bIns="0" rtlCol="0" anchor="ctr">
+            <a:noAutofit/>
+          </a:bodyPr>
+          <a:lstStyle>
+            <a:defPPr>
+              <a:defRPr lang="en-US"/>
+            </a:defPPr>
+            <a:lvl1pPr algn="ctr">
+              <a:defRPr sz="1100">
+                <a:solidFill>
+                  <a:schemeClr val="tx1">
+                    <a:lumMod val="95000"/>
+                  </a:schemeClr>
+                </a:solidFill>
+                <a:latin typeface="Amazon Ember"/>
+                <a:ea typeface="Amazon Ember Light" charset="0"/>
+                <a:cs typeface="Amazon Ember Light" charset="0"/>
+              </a:defRPr>
+            </a:lvl1pPr>
+          </a:lstStyle>
+          <a:p>
+            <a:r>
+              <a:rPr lang="en-US" dirty="0"/>
+              <a:t>Lambda function</a:t>
+            </a:r>
+          </a:p>
+          <a:p>
+            <a:r>
+              <a:rPr lang="en-US" sz="800" i="1" dirty="0" smtClean="0"/>
+              <a:t>COMPLIANCE_RULESET_LATEST_INSTALLED</a:t>
+            </a:r>
+            <a:endParaRPr lang="en-US" i="1" dirty="0"/>
+          </a:p>
+        </p:txBody>
+      </p:sp>
+      <p:pic>
+        <p:nvPicPr>
+          <p:cNvPr id="65" name="Picture 64"/>
+          <p:cNvPicPr>
+            <a:picLocks noChangeAspect="1"/>
+          </p:cNvPicPr>
+          <p:nvPr/>
+        </p:nvPicPr>
+        <p:blipFill>
+          <a:blip r:embed="rId4">
+            <a:extLst>
+              <a:ext uri="{28A0092B-C50C-407E-A947-70E740481C1C}">
+                <a14:useLocalDpi xmlns:a14="http://schemas.microsoft.com/office/drawing/2010/main" val="0"/>
+              </a:ext>
+            </a:extLst>
+          </a:blip>
+          <a:stretch>
+            <a:fillRect/>
+          </a:stretch>
+        </p:blipFill>
+        <p:spPr>
+          <a:xfrm>
+            <a:off x="6227861" y="3501189"/>
+            <a:ext cx="271146" cy="320040"/>
+          </a:xfrm>
+          <a:prstGeom prst="rect">
+            <a:avLst/>
+          </a:prstGeom>
+        </p:spPr>
+      </p:pic>
+      <p:pic>
+        <p:nvPicPr>
+          <p:cNvPr id="67" name="Picture 66"/>
+          <p:cNvPicPr>
+            <a:picLocks noChangeAspect="1"/>
+          </p:cNvPicPr>
+          <p:nvPr/>
+        </p:nvPicPr>
+        <p:blipFill>
+          <a:blip r:embed="rId5">
+            <a:extLst>
+              <a:ext uri="{28A0092B-C50C-407E-A947-70E740481C1C}">
+                <a14:useLocalDpi xmlns:a14="http://schemas.microsoft.com/office/drawing/2010/main" val="0"/>
+              </a:ext>
+            </a:extLst>
+          </a:blip>
+          <a:stretch>
+            <a:fillRect/>
+          </a:stretch>
+        </p:blipFill>
+        <p:spPr>
+          <a:xfrm>
+            <a:off x="6571004" y="3157543"/>
+            <a:ext cx="276792" cy="320040"/>
+          </a:xfrm>
+          <a:prstGeom prst="rect">
+            <a:avLst/>
+          </a:prstGeom>
+        </p:spPr>
+      </p:pic>
+      <p:pic>
+        <p:nvPicPr>
+          <p:cNvPr id="69" name="Picture 68"/>
+          <p:cNvPicPr>
+            <a:picLocks noChangeAspect="1"/>
+          </p:cNvPicPr>
+          <p:nvPr/>
+        </p:nvPicPr>
+        <p:blipFill>
+          <a:blip r:embed="rId6">
+            <a:extLst>
+              <a:ext uri="{28A0092B-C50C-407E-A947-70E740481C1C}">
+                <a14:useLocalDpi xmlns:a14="http://schemas.microsoft.com/office/drawing/2010/main" val="0"/>
+              </a:ext>
+            </a:extLst>
+          </a:blip>
+          <a:stretch>
+            <a:fillRect/>
+          </a:stretch>
+        </p:blipFill>
+        <p:spPr>
+          <a:xfrm>
+            <a:off x="6579363" y="3496234"/>
+            <a:ext cx="266700" cy="320040"/>
+          </a:xfrm>
+          <a:prstGeom prst="rect">
+            <a:avLst/>
+          </a:prstGeom>
+        </p:spPr>
+      </p:pic>
+      <p:pic>
+        <p:nvPicPr>
+          <p:cNvPr id="71" name="Picture 70"/>
+          <p:cNvPicPr>
+            <a:picLocks noChangeAspect="1"/>
+          </p:cNvPicPr>
+          <p:nvPr/>
+        </p:nvPicPr>
+        <p:blipFill>
+          <a:blip r:embed="rId7">
+            <a:extLst>
+              <a:ext uri="{28A0092B-C50C-407E-A947-70E740481C1C}">
+                <a14:useLocalDpi xmlns:a14="http://schemas.microsoft.com/office/drawing/2010/main" val="0"/>
+              </a:ext>
+            </a:extLst>
+          </a:blip>
+          <a:stretch>
+            <a:fillRect/>
+          </a:stretch>
+        </p:blipFill>
+        <p:spPr>
+          <a:xfrm>
+            <a:off x="6217793" y="3157543"/>
+            <a:ext cx="272428" cy="292608"/>
+          </a:xfrm>
+          <a:prstGeom prst="rect">
+            <a:avLst/>
+          </a:prstGeom>
+        </p:spPr>
+      </p:pic>
+      <p:sp>
+        <p:nvSpPr>
+          <p:cNvPr id="23" name="Rectangle 22"/>
+          <p:cNvSpPr/>
+          <p:nvPr/>
+        </p:nvSpPr>
+        <p:spPr>
+          <a:xfrm>
+            <a:off x="7124885" y="3262139"/>
+            <a:ext cx="3919353" cy="430887"/>
+          </a:xfrm>
+          <a:prstGeom prst="rect">
+            <a:avLst/>
+          </a:prstGeom>
+        </p:spPr>
+        <p:txBody>
+          <a:bodyPr wrap="square">
+            <a:spAutoFit/>
+          </a:bodyPr>
+          <a:lstStyle/>
+          <a:p>
+            <a:r>
+              <a:rPr lang="en-US" sz="1100" dirty="0">
+                <a:latin typeface="Amazon Ember" panose="020B0603020204020204" pitchFamily="34" charset="0"/>
+                <a:ea typeface="Amazon Ember" panose="020B0603020204020204" pitchFamily="34" charset="0"/>
+                <a:cs typeface="Amazon Ember" panose="020B0603020204020204" pitchFamily="34" charset="0"/>
+              </a:rPr>
+              <a:t>Various </a:t>
+            </a:r>
+            <a:r>
+              <a:rPr lang="en-US" sz="1100" b="1" dirty="0">
+                <a:latin typeface="Amazon Ember" panose="020B0603020204020204" pitchFamily="34" charset="0"/>
+                <a:ea typeface="Amazon Ember" panose="020B0603020204020204" pitchFamily="34" charset="0"/>
+                <a:cs typeface="Amazon Ember" panose="020B0603020204020204" pitchFamily="34" charset="0"/>
+              </a:rPr>
+              <a:t>AWS resources</a:t>
+            </a:r>
+            <a:r>
+              <a:rPr lang="en-US" sz="1100" dirty="0">
+                <a:latin typeface="Amazon Ember" panose="020B0603020204020204" pitchFamily="34" charset="0"/>
+                <a:ea typeface="Amazon Ember" panose="020B0603020204020204" pitchFamily="34" charset="0"/>
+                <a:cs typeface="Amazon Ember" panose="020B0603020204020204" pitchFamily="34" charset="0"/>
+              </a:rPr>
+              <a:t> and services are verified on the defined </a:t>
+            </a:r>
+            <a:r>
+              <a:rPr lang="en-US" sz="1100" dirty="0" smtClean="0">
+                <a:latin typeface="Amazon Ember" panose="020B0603020204020204" pitchFamily="34" charset="0"/>
+                <a:ea typeface="Amazon Ember" panose="020B0603020204020204" pitchFamily="34" charset="0"/>
+                <a:cs typeface="Amazon Ember" panose="020B0603020204020204" pitchFamily="34" charset="0"/>
+              </a:rPr>
+              <a:t>RuleSet.</a:t>
+            </a:r>
+            <a:endParaRPr lang="en-US" sz="1100" dirty="0">
+              <a:latin typeface="Amazon Ember" panose="020B0603020204020204" pitchFamily="34" charset="0"/>
+              <a:ea typeface="Amazon Ember" panose="020B0603020204020204" pitchFamily="34" charset="0"/>
+              <a:cs typeface="Amazon Ember" panose="020B0603020204020204" pitchFamily="34" charset="0"/>
+            </a:endParaRPr>
+          </a:p>
+        </p:txBody>
+      </p:sp>
+      <p:sp>
+        <p:nvSpPr>
+          <p:cNvPr id="24" name="Rectangle 23"/>
+          <p:cNvSpPr/>
+          <p:nvPr/>
+        </p:nvSpPr>
+        <p:spPr>
+          <a:xfrm>
+            <a:off x="7116628" y="1142333"/>
+            <a:ext cx="3383805" cy="600164"/>
+          </a:xfrm>
+          <a:prstGeom prst="rect">
+            <a:avLst/>
+          </a:prstGeom>
+        </p:spPr>
+        <p:txBody>
+          <a:bodyPr wrap="square">
+            <a:spAutoFit/>
+          </a:bodyPr>
+          <a:lstStyle/>
+          <a:p>
+            <a:r>
+              <a:rPr lang="en-US" sz="1100" b="1" dirty="0">
+                <a:latin typeface="Amazon Ember" panose="020B0603020204020204" pitchFamily="34" charset="0"/>
+                <a:ea typeface="Amazon Ember" panose="020B0603020204020204" pitchFamily="34" charset="0"/>
+                <a:cs typeface="Amazon Ember" panose="020B0603020204020204" pitchFamily="34" charset="0"/>
+              </a:rPr>
+              <a:t>AWS Config</a:t>
+            </a:r>
+            <a:r>
+              <a:rPr lang="en-US" sz="1100" dirty="0">
+                <a:latin typeface="Amazon Ember" panose="020B0603020204020204" pitchFamily="34" charset="0"/>
+                <a:ea typeface="Amazon Ember" panose="020B0603020204020204" pitchFamily="34" charset="0"/>
+                <a:cs typeface="Amazon Ember" panose="020B0603020204020204" pitchFamily="34" charset="0"/>
+              </a:rPr>
+              <a:t> records configurations. </a:t>
+            </a:r>
+            <a:r>
+              <a:rPr lang="en-US" sz="1100" dirty="0" smtClean="0">
+                <a:latin typeface="Amazon Ember" panose="020B0603020204020204" pitchFamily="34" charset="0"/>
+                <a:ea typeface="Amazon Ember" panose="020B0603020204020204" pitchFamily="34" charset="0"/>
+                <a:cs typeface="Amazon Ember" panose="020B0603020204020204" pitchFamily="34" charset="0"/>
+              </a:rPr>
+              <a:t>Change of configuration </a:t>
+            </a:r>
+            <a:r>
+              <a:rPr lang="en-US" sz="1100" dirty="0">
+                <a:latin typeface="Amazon Ember" panose="020B0603020204020204" pitchFamily="34" charset="0"/>
+                <a:ea typeface="Amazon Ember" panose="020B0603020204020204" pitchFamily="34" charset="0"/>
+                <a:cs typeface="Amazon Ember" panose="020B0603020204020204" pitchFamily="34" charset="0"/>
+              </a:rPr>
+              <a:t>triggers appropriate Rule(s) to verify the compliance of the new configuration.</a:t>
+            </a:r>
+          </a:p>
+        </p:txBody>
+      </p:sp>
+      <p:sp>
+        <p:nvSpPr>
+          <p:cNvPr id="72" name="Rectangle 71"/>
+          <p:cNvSpPr/>
+          <p:nvPr/>
+        </p:nvSpPr>
+        <p:spPr>
+          <a:xfrm>
+            <a:off x="7116628" y="4154912"/>
+            <a:ext cx="3788855" cy="430887"/>
+          </a:xfrm>
+          <a:prstGeom prst="rect">
+            <a:avLst/>
+          </a:prstGeom>
+        </p:spPr>
+        <p:txBody>
+          <a:bodyPr wrap="square">
+            <a:spAutoFit/>
+          </a:bodyPr>
+          <a:lstStyle/>
+          <a:p>
+            <a:r>
+              <a:rPr lang="en-US" sz="1100" dirty="0" smtClean="0">
+                <a:latin typeface="Amazon Ember" panose="020B0603020204020204" pitchFamily="34" charset="0"/>
+                <a:ea typeface="Amazon Ember" panose="020B0603020204020204" pitchFamily="34" charset="0"/>
+                <a:cs typeface="Amazon Ember" panose="020B0603020204020204" pitchFamily="34" charset="0"/>
+              </a:rPr>
+              <a:t>The results of </a:t>
+            </a:r>
+            <a:r>
+              <a:rPr lang="en-US" sz="1100" dirty="0">
+                <a:latin typeface="Amazon Ember" panose="020B0603020204020204" pitchFamily="34" charset="0"/>
+                <a:ea typeface="Amazon Ember" panose="020B0603020204020204" pitchFamily="34" charset="0"/>
+                <a:cs typeface="Amazon Ember" panose="020B0603020204020204" pitchFamily="34" charset="0"/>
+              </a:rPr>
+              <a:t>compliance and non-compliance are displayed on the </a:t>
+            </a:r>
+            <a:r>
+              <a:rPr lang="en-US" sz="1100" b="1" dirty="0">
+                <a:latin typeface="Amazon Ember" panose="020B0603020204020204" pitchFamily="34" charset="0"/>
+                <a:ea typeface="Amazon Ember" panose="020B0603020204020204" pitchFamily="34" charset="0"/>
+                <a:cs typeface="Amazon Ember" panose="020B0603020204020204" pitchFamily="34" charset="0"/>
+              </a:rPr>
+              <a:t>Config </a:t>
+            </a:r>
+            <a:r>
+              <a:rPr lang="en-US" sz="1100" b="1" dirty="0" smtClean="0">
+                <a:latin typeface="Amazon Ember" panose="020B0603020204020204" pitchFamily="34" charset="0"/>
+                <a:ea typeface="Amazon Ember" panose="020B0603020204020204" pitchFamily="34" charset="0"/>
+                <a:cs typeface="Amazon Ember" panose="020B0603020204020204" pitchFamily="34" charset="0"/>
+              </a:rPr>
+              <a:t>Dashboard.</a:t>
+            </a:r>
+            <a:endParaRPr lang="en-US" sz="1100" dirty="0">
+              <a:latin typeface="Amazon Ember" panose="020B0603020204020204" pitchFamily="34" charset="0"/>
+              <a:ea typeface="Amazon Ember" panose="020B0603020204020204" pitchFamily="34" charset="0"/>
+              <a:cs typeface="Amazon Ember" panose="020B0603020204020204" pitchFamily="34" charset="0"/>
+            </a:endParaRPr>
+          </a:p>
+        </p:txBody>
+      </p:sp>
+      <p:pic>
+        <p:nvPicPr>
+          <p:cNvPr id="74" name="Picture 73"/>
+          <p:cNvPicPr>
+            <a:picLocks noChangeAspect="1"/>
+          </p:cNvPicPr>
+          <p:nvPr/>
+        </p:nvPicPr>
+        <p:blipFill>
+          <a:blip r:embed="rId3">
+            <a:extLst>
+              <a:ext uri="{28A0092B-C50C-407E-A947-70E740481C1C}">
+                <a14:useLocalDpi xmlns:a14="http://schemas.microsoft.com/office/drawing/2010/main" val="0"/>
+              </a:ext>
+            </a:extLst>
+          </a:blip>
+          <a:stretch>
+            <a:fillRect/>
+          </a:stretch>
+        </p:blipFill>
+        <p:spPr>
+          <a:xfrm>
+            <a:off x="6287497" y="4020268"/>
+            <a:ext cx="475280" cy="570338"/>
+          </a:xfrm>
+          <a:prstGeom prst="rect">
+            <a:avLst/>
+          </a:prstGeom>
+        </p:spPr>
+      </p:pic>
+      <p:pic>
+        <p:nvPicPr>
+          <p:cNvPr id="73" name="Picture 72"/>
+          <p:cNvPicPr>
+            <a:picLocks noChangeAspect="1"/>
+          </p:cNvPicPr>
+          <p:nvPr/>
+        </p:nvPicPr>
+        <p:blipFill>
+          <a:blip r:embed="rId8">
+            <a:extLst>
+              <a:ext uri="{28A0092B-C50C-407E-A947-70E740481C1C}">
+                <a14:useLocalDpi xmlns:a14="http://schemas.microsoft.com/office/drawing/2010/main" val="0"/>
+              </a:ext>
+            </a:extLst>
+          </a:blip>
+          <a:stretch>
+            <a:fillRect/>
+          </a:stretch>
+        </p:blipFill>
+        <p:spPr>
+          <a:xfrm>
+            <a:off x="6607253" y="4285716"/>
+            <a:ext cx="318346" cy="439622"/>
+          </a:xfrm>
+          <a:prstGeom prst="rect">
+            <a:avLst/>
+          </a:prstGeom>
+        </p:spPr>
+      </p:pic>
+      <p:sp>
+        <p:nvSpPr>
+          <p:cNvPr id="75" name="Rectangle 74"/>
+          <p:cNvSpPr/>
+          <p:nvPr/>
+        </p:nvSpPr>
+        <p:spPr>
+          <a:xfrm>
+            <a:off x="2578811" y="1113329"/>
+            <a:ext cx="2223277" cy="769441"/>
+          </a:xfrm>
+          <a:prstGeom prst="rect">
+            <a:avLst/>
+          </a:prstGeom>
+        </p:spPr>
+        <p:txBody>
+          <a:bodyPr wrap="square">
+            <a:spAutoFit/>
+          </a:bodyPr>
+          <a:lstStyle/>
+          <a:p>
+            <a:r>
+              <a:rPr lang="en-US" sz="1100" dirty="0">
+                <a:latin typeface="Amazon Ember" panose="020B0603020204020204" pitchFamily="34" charset="0"/>
+                <a:ea typeface="Amazon Ember" panose="020B0603020204020204" pitchFamily="34" charset="0"/>
+                <a:cs typeface="Amazon Ember" panose="020B0603020204020204" pitchFamily="34" charset="0"/>
+              </a:rPr>
+              <a:t>The code of </a:t>
+            </a:r>
+            <a:r>
+              <a:rPr lang="en-US" sz="1100" dirty="0" smtClean="0">
+                <a:latin typeface="Amazon Ember" panose="020B0603020204020204" pitchFamily="34" charset="0"/>
+                <a:ea typeface="Amazon Ember" panose="020B0603020204020204" pitchFamily="34" charset="0"/>
+                <a:cs typeface="Amazon Ember" panose="020B0603020204020204" pitchFamily="34" charset="0"/>
+              </a:rPr>
+              <a:t>each Rule is located </a:t>
+            </a:r>
+            <a:r>
+              <a:rPr lang="en-US" sz="1100" dirty="0">
+                <a:latin typeface="Amazon Ember" panose="020B0603020204020204" pitchFamily="34" charset="0"/>
+                <a:ea typeface="Amazon Ember" panose="020B0603020204020204" pitchFamily="34" charset="0"/>
+                <a:cs typeface="Amazon Ember" panose="020B0603020204020204" pitchFamily="34" charset="0"/>
+              </a:rPr>
+              <a:t>in AWS Lambda functions to protect the code base from </a:t>
+            </a:r>
+            <a:r>
+              <a:rPr lang="en-US" sz="1100" dirty="0" smtClean="0">
+                <a:latin typeface="Amazon Ember" panose="020B0603020204020204" pitchFamily="34" charset="0"/>
+                <a:ea typeface="Amazon Ember" panose="020B0603020204020204" pitchFamily="34" charset="0"/>
+                <a:cs typeface="Amazon Ember" panose="020B0603020204020204" pitchFamily="34" charset="0"/>
+              </a:rPr>
+              <a:t>tempering.</a:t>
+            </a:r>
+            <a:endParaRPr lang="en-US" sz="1100" dirty="0">
+              <a:latin typeface="Amazon Ember" panose="020B0603020204020204" pitchFamily="34" charset="0"/>
+              <a:ea typeface="Amazon Ember" panose="020B0603020204020204" pitchFamily="34" charset="0"/>
+              <a:cs typeface="Amazon Ember" panose="020B0603020204020204" pitchFamily="34" charset="0"/>
+            </a:endParaRPr>
+          </a:p>
+        </p:txBody>
+      </p:sp>
+      <p:sp>
+        <p:nvSpPr>
+          <p:cNvPr id="76" name="Rectangle 75"/>
+          <p:cNvSpPr/>
+          <p:nvPr/>
+        </p:nvSpPr>
+        <p:spPr>
+          <a:xfrm>
+            <a:off x="2578811" y="2234358"/>
+            <a:ext cx="2290863" cy="769441"/>
+          </a:xfrm>
+          <a:prstGeom prst="rect">
+            <a:avLst/>
+          </a:prstGeom>
+        </p:spPr>
+        <p:txBody>
+          <a:bodyPr wrap="square">
+            <a:spAutoFit/>
+          </a:bodyPr>
+          <a:lstStyle/>
+          <a:p>
+            <a:r>
+              <a:rPr lang="en-US" sz="1100" dirty="0" smtClean="0">
+                <a:latin typeface="Amazon Ember" panose="020B0603020204020204" pitchFamily="34" charset="0"/>
+                <a:ea typeface="Amazon Ember" panose="020B0603020204020204" pitchFamily="34" charset="0"/>
+                <a:cs typeface="Amazon Ember" panose="020B0603020204020204" pitchFamily="34" charset="0"/>
+              </a:rPr>
+              <a:t>One rule </a:t>
+            </a:r>
+            <a:r>
+              <a:rPr lang="en-US" sz="1100" dirty="0" smtClean="0">
+                <a:latin typeface="Amazon Ember" panose="020B0603020204020204" pitchFamily="34" charset="0"/>
+                <a:ea typeface="Amazon Ember" panose="020B0603020204020204" pitchFamily="34" charset="0"/>
+                <a:cs typeface="Amazon Ember" panose="020B0603020204020204" pitchFamily="34" charset="0"/>
+              </a:rPr>
+              <a:t>verifies the </a:t>
+            </a:r>
+            <a:r>
+              <a:rPr lang="en-US" sz="1100" dirty="0">
+                <a:latin typeface="Amazon Ember" panose="020B0603020204020204" pitchFamily="34" charset="0"/>
+                <a:ea typeface="Amazon Ember" panose="020B0603020204020204" pitchFamily="34" charset="0"/>
+                <a:cs typeface="Amazon Ember" panose="020B0603020204020204" pitchFamily="34" charset="0"/>
+              </a:rPr>
+              <a:t>R</a:t>
+            </a:r>
+            <a:r>
+              <a:rPr lang="en-US" sz="1100" dirty="0" smtClean="0">
+                <a:latin typeface="Amazon Ember" panose="020B0603020204020204" pitchFamily="34" charset="0"/>
+                <a:ea typeface="Amazon Ember" panose="020B0603020204020204" pitchFamily="34" charset="0"/>
+                <a:cs typeface="Amazon Ember" panose="020B0603020204020204" pitchFamily="34" charset="0"/>
+              </a:rPr>
+              <a:t>uleSet deployed and reports </a:t>
+            </a:r>
+            <a:r>
+              <a:rPr lang="en-US" sz="1100" dirty="0" smtClean="0">
+                <a:latin typeface="Amazon Ember" panose="020B0603020204020204" pitchFamily="34" charset="0"/>
+                <a:ea typeface="Amazon Ember" panose="020B0603020204020204" pitchFamily="34" charset="0"/>
+                <a:cs typeface="Amazon Ember" panose="020B0603020204020204" pitchFamily="34" charset="0"/>
+              </a:rPr>
+              <a:t>regularly the </a:t>
+            </a:r>
+            <a:r>
+              <a:rPr lang="en-US" sz="1100" dirty="0">
+                <a:latin typeface="Amazon Ember" panose="020B0603020204020204" pitchFamily="34" charset="0"/>
+                <a:ea typeface="Amazon Ember" panose="020B0603020204020204" pitchFamily="34" charset="0"/>
+                <a:cs typeface="Amazon Ember" panose="020B0603020204020204" pitchFamily="34" charset="0"/>
+              </a:rPr>
+              <a:t>compliance status of all Rules evaluations.</a:t>
+            </a:r>
+          </a:p>
+        </p:txBody>
+      </p:sp>
+      <p:cxnSp>
+        <p:nvCxnSpPr>
+          <p:cNvPr id="79" name="Straight Arrow Connector 78"/>
+          <p:cNvCxnSpPr/>
+          <p:nvPr/>
+        </p:nvCxnSpPr>
+        <p:spPr>
+          <a:xfrm>
+            <a:off x="1555688" y="3629735"/>
+            <a:ext cx="471218" cy="0"/>
+          </a:xfrm>
+          <a:prstGeom prst="straightConnector1">
+            <a:avLst/>
+          </a:prstGeom>
+          <a:ln w="38100">
+            <a:tailEnd type="triangle"/>
+          </a:ln>
+        </p:spPr>
+        <p:style>
+          <a:lnRef idx="1">
+            <a:schemeClr val="accent1"/>
+          </a:lnRef>
+          <a:fillRef idx="0">
+            <a:schemeClr val="accent1"/>
+          </a:fillRef>
+          <a:effectRef idx="0">
+            <a:schemeClr val="accent1"/>
+          </a:effectRef>
+          <a:fontRef idx="minor">
+            <a:schemeClr val="tx1"/>
+          </a:fontRef>
+        </p:style>
+      </p:cxnSp>
+      <p:sp>
+        <p:nvSpPr>
+          <p:cNvPr id="81" name="TextBox 80"/>
+          <p:cNvSpPr txBox="1"/>
+          <p:nvPr/>
+        </p:nvSpPr>
+        <p:spPr>
+          <a:xfrm>
+            <a:off x="5863569" y="4687373"/>
+            <a:ext cx="1312588" cy="261610"/>
+          </a:xfrm>
+          <a:prstGeom prst="rect">
+            <a:avLst/>
+          </a:prstGeom>
+          <a:noFill/>
+        </p:spPr>
+        <p:txBody>
+          <a:bodyPr wrap="square" lIns="0" tIns="0" rIns="0" bIns="0" rtlCol="0" anchor="ctr">
+            <a:noAutofit/>
+          </a:bodyPr>
+          <a:lstStyle>
+            <a:defPPr>
+              <a:defRPr lang="en-US"/>
+            </a:defPPr>
+            <a:lvl1pPr algn="ctr">
+              <a:defRPr sz="1100">
+                <a:solidFill>
+                  <a:schemeClr val="tx1">
+                    <a:lumMod val="95000"/>
+                  </a:schemeClr>
+                </a:solidFill>
+                <a:latin typeface="Amazon Ember"/>
+                <a:ea typeface="Amazon Ember Light" charset="0"/>
+                <a:cs typeface="Amazon Ember Light" charset="0"/>
+              </a:defRPr>
+            </a:lvl1pPr>
+          </a:lstStyle>
+          <a:p>
+            <a:r>
+              <a:rPr lang="en-US" dirty="0"/>
+              <a:t>Config Dashboard</a:t>
+            </a:r>
+          </a:p>
+        </p:txBody>
+      </p:sp>
+      <p:pic>
+        <p:nvPicPr>
+          <p:cNvPr id="82" name="Picture 81"/>
+          <p:cNvPicPr>
+            <a:picLocks noChangeAspect="1"/>
+          </p:cNvPicPr>
+          <p:nvPr/>
+        </p:nvPicPr>
+        <p:blipFill>
+          <a:blip r:embed="rId9">
+            <a:extLst>
+              <a:ext uri="{28A0092B-C50C-407E-A947-70E740481C1C}">
+                <a14:useLocalDpi xmlns:a14="http://schemas.microsoft.com/office/drawing/2010/main" val="0"/>
+              </a:ext>
+            </a:extLst>
+          </a:blip>
+          <a:stretch>
+            <a:fillRect/>
+          </a:stretch>
+        </p:blipFill>
+        <p:spPr>
+          <a:xfrm>
+            <a:off x="6354007" y="2125544"/>
+            <a:ext cx="335702" cy="636068"/>
+          </a:xfrm>
+          <a:prstGeom prst="rect">
+            <a:avLst/>
+          </a:prstGeom>
+        </p:spPr>
+      </p:pic>
+      <p:sp>
+        <p:nvSpPr>
+          <p:cNvPr id="83" name="Rectangle 82"/>
+          <p:cNvSpPr/>
+          <p:nvPr/>
+        </p:nvSpPr>
+        <p:spPr>
+          <a:xfrm>
+            <a:off x="3141498" y="3340110"/>
+            <a:ext cx="1805502" cy="577081"/>
+          </a:xfrm>
+          <a:prstGeom prst="rect">
+            <a:avLst/>
+          </a:prstGeom>
+        </p:spPr>
+        <p:txBody>
+          <a:bodyPr wrap="square">
+            <a:spAutoFit/>
+          </a:bodyPr>
+          <a:lstStyle/>
+          <a:p>
+            <a:r>
+              <a:rPr lang="en-US" sz="1050" b="1" dirty="0" smtClean="0">
+                <a:latin typeface="Amazon Ember" panose="020B0603020204020204" pitchFamily="34" charset="0"/>
+                <a:ea typeface="Amazon Ember" panose="020B0603020204020204" pitchFamily="34" charset="0"/>
+                <a:cs typeface="Amazon Ember" panose="020B0603020204020204" pitchFamily="34" charset="0"/>
+              </a:rPr>
+              <a:t>Aggregate</a:t>
+            </a:r>
+            <a:r>
+              <a:rPr lang="en-US" sz="1050" dirty="0" smtClean="0">
+                <a:latin typeface="Amazon Ember" panose="020B0603020204020204" pitchFamily="34" charset="0"/>
+                <a:ea typeface="Amazon Ember" panose="020B0603020204020204" pitchFamily="34" charset="0"/>
+                <a:cs typeface="Amazon Ember" panose="020B0603020204020204" pitchFamily="34" charset="0"/>
+              </a:rPr>
+              <a:t> the </a:t>
+            </a:r>
+            <a:r>
+              <a:rPr lang="en-US" sz="1050" dirty="0">
+                <a:latin typeface="Amazon Ember" panose="020B0603020204020204" pitchFamily="34" charset="0"/>
+                <a:ea typeface="Amazon Ember" panose="020B0603020204020204" pitchFamily="34" charset="0"/>
+                <a:cs typeface="Amazon Ember" panose="020B0603020204020204" pitchFamily="34" charset="0"/>
+              </a:rPr>
+              <a:t>streaming </a:t>
+            </a:r>
+            <a:r>
+              <a:rPr lang="en-US" sz="1050" dirty="0" smtClean="0">
+                <a:latin typeface="Amazon Ember" panose="020B0603020204020204" pitchFamily="34" charset="0"/>
+                <a:ea typeface="Amazon Ember" panose="020B0603020204020204" pitchFamily="34" charset="0"/>
+                <a:cs typeface="Amazon Ember" panose="020B0603020204020204" pitchFamily="34" charset="0"/>
+              </a:rPr>
+              <a:t>compliance events before delivery to S3.</a:t>
+            </a:r>
+            <a:endParaRPr lang="en-US" sz="1050" dirty="0">
+              <a:latin typeface="Amazon Ember" panose="020B0603020204020204" pitchFamily="34" charset="0"/>
+              <a:ea typeface="Amazon Ember" panose="020B0603020204020204" pitchFamily="34" charset="0"/>
+              <a:cs typeface="Amazon Ember" panose="020B0603020204020204" pitchFamily="34" charset="0"/>
+            </a:endParaRPr>
+          </a:p>
+        </p:txBody>
+      </p:sp>
+      <p:sp>
+        <p:nvSpPr>
+          <p:cNvPr id="84" name="Rectangle 83"/>
+          <p:cNvSpPr/>
+          <p:nvPr/>
+        </p:nvSpPr>
+        <p:spPr>
+          <a:xfrm>
+            <a:off x="3141498" y="4477932"/>
+            <a:ext cx="1920696" cy="415498"/>
+          </a:xfrm>
+          <a:prstGeom prst="rect">
+            <a:avLst/>
+          </a:prstGeom>
+        </p:spPr>
+        <p:txBody>
+          <a:bodyPr wrap="square">
+            <a:spAutoFit/>
+          </a:bodyPr>
+          <a:lstStyle/>
+          <a:p>
+            <a:r>
+              <a:rPr lang="en-US" sz="1050" b="1" dirty="0" smtClean="0">
+                <a:latin typeface="Amazon Ember" panose="020B0603020204020204" pitchFamily="34" charset="0"/>
+                <a:ea typeface="Amazon Ember" panose="020B0603020204020204" pitchFamily="34" charset="0"/>
+                <a:cs typeface="Amazon Ember" panose="020B0603020204020204" pitchFamily="34" charset="0"/>
+              </a:rPr>
+              <a:t>Store all </a:t>
+            </a:r>
+            <a:r>
+              <a:rPr lang="en-US" sz="1050" b="1" dirty="0">
+                <a:latin typeface="Amazon Ember" panose="020B0603020204020204" pitchFamily="34" charset="0"/>
+                <a:ea typeface="Amazon Ember" panose="020B0603020204020204" pitchFamily="34" charset="0"/>
+                <a:cs typeface="Amazon Ember" panose="020B0603020204020204" pitchFamily="34" charset="0"/>
+              </a:rPr>
+              <a:t>compliance </a:t>
+            </a:r>
+            <a:r>
+              <a:rPr lang="en-US" sz="1050" b="1" dirty="0" smtClean="0">
+                <a:latin typeface="Amazon Ember" panose="020B0603020204020204" pitchFamily="34" charset="0"/>
+                <a:ea typeface="Amazon Ember" panose="020B0603020204020204" pitchFamily="34" charset="0"/>
+                <a:cs typeface="Amazon Ember" panose="020B0603020204020204" pitchFamily="34" charset="0"/>
+              </a:rPr>
+              <a:t>events </a:t>
+            </a:r>
+            <a:r>
+              <a:rPr lang="en-US" sz="1050" dirty="0">
+                <a:latin typeface="Amazon Ember" panose="020B0603020204020204" pitchFamily="34" charset="0"/>
+                <a:ea typeface="Amazon Ember" panose="020B0603020204020204" pitchFamily="34" charset="0"/>
+                <a:cs typeface="Amazon Ember" panose="020B0603020204020204" pitchFamily="34" charset="0"/>
+              </a:rPr>
+              <a:t>of all resources over </a:t>
+            </a:r>
+            <a:r>
+              <a:rPr lang="en-US" sz="1050" dirty="0" smtClean="0">
+                <a:latin typeface="Amazon Ember" panose="020B0603020204020204" pitchFamily="34" charset="0"/>
+                <a:ea typeface="Amazon Ember" panose="020B0603020204020204" pitchFamily="34" charset="0"/>
+                <a:cs typeface="Amazon Ember" panose="020B0603020204020204" pitchFamily="34" charset="0"/>
+              </a:rPr>
+              <a:t>time.</a:t>
+            </a:r>
+            <a:endParaRPr lang="en-US" sz="1050" dirty="0">
+              <a:latin typeface="Amazon Ember" panose="020B0603020204020204" pitchFamily="34" charset="0"/>
+              <a:ea typeface="Amazon Ember" panose="020B0603020204020204" pitchFamily="34" charset="0"/>
+              <a:cs typeface="Amazon Ember" panose="020B0603020204020204" pitchFamily="34" charset="0"/>
+            </a:endParaRPr>
+          </a:p>
+        </p:txBody>
+      </p:sp>
+      <p:sp>
+        <p:nvSpPr>
+          <p:cNvPr id="85" name="TextBox 84"/>
+          <p:cNvSpPr txBox="1"/>
+          <p:nvPr/>
+        </p:nvSpPr>
+        <p:spPr>
+          <a:xfrm>
+            <a:off x="5863569" y="2768393"/>
+            <a:ext cx="1312588" cy="261610"/>
+          </a:xfrm>
+          <a:prstGeom prst="rect">
+            <a:avLst/>
+          </a:prstGeom>
+          <a:noFill/>
+        </p:spPr>
+        <p:txBody>
+          <a:bodyPr wrap="square" lIns="0" tIns="0" rIns="0" bIns="0" rtlCol="0" anchor="ctr">
+            <a:noAutofit/>
+          </a:bodyPr>
+          <a:lstStyle>
+            <a:defPPr>
+              <a:defRPr lang="en-US"/>
+            </a:defPPr>
+            <a:lvl1pPr algn="ctr">
+              <a:defRPr sz="1100">
+                <a:solidFill>
+                  <a:schemeClr val="tx1">
+                    <a:lumMod val="95000"/>
+                  </a:schemeClr>
+                </a:solidFill>
+                <a:latin typeface="Amazon Ember"/>
+                <a:ea typeface="Amazon Ember Light" charset="0"/>
+                <a:cs typeface="Amazon Ember Light" charset="0"/>
+              </a:defRPr>
+            </a:lvl1pPr>
+          </a:lstStyle>
+          <a:p>
+            <a:r>
+              <a:rPr lang="en-US" dirty="0"/>
+              <a:t>IAM Role</a:t>
+            </a:r>
+          </a:p>
+        </p:txBody>
+      </p:sp>
+      <p:sp>
+        <p:nvSpPr>
+          <p:cNvPr id="86" name="Rectangle 85"/>
+          <p:cNvSpPr/>
+          <p:nvPr/>
+        </p:nvSpPr>
+        <p:spPr>
+          <a:xfrm>
+            <a:off x="7116627" y="2143496"/>
+            <a:ext cx="3785136" cy="600164"/>
+          </a:xfrm>
+          <a:prstGeom prst="rect">
+            <a:avLst/>
+          </a:prstGeom>
+        </p:spPr>
+        <p:txBody>
+          <a:bodyPr wrap="square">
+            <a:spAutoFit/>
+          </a:bodyPr>
+          <a:lstStyle/>
+          <a:p>
+            <a:r>
+              <a:rPr lang="en-US" sz="1100" b="1" dirty="0">
+                <a:latin typeface="Amazon Ember" panose="020B0603020204020204" pitchFamily="34" charset="0"/>
+                <a:ea typeface="Amazon Ember" panose="020B0603020204020204" pitchFamily="34" charset="0"/>
+                <a:cs typeface="Amazon Ember" panose="020B0603020204020204" pitchFamily="34" charset="0"/>
+              </a:rPr>
+              <a:t>AWS IAM </a:t>
+            </a:r>
+            <a:r>
+              <a:rPr lang="en-US" sz="1100" dirty="0">
+                <a:latin typeface="Amazon Ember" panose="020B0603020204020204" pitchFamily="34" charset="0"/>
+                <a:ea typeface="Amazon Ember" panose="020B0603020204020204" pitchFamily="34" charset="0"/>
+                <a:cs typeface="Amazon Ember" panose="020B0603020204020204" pitchFamily="34" charset="0"/>
+              </a:rPr>
+              <a:t>provides short-lived credentials to the lambda functions with the permissions to read the configuration, and react if necessary.</a:t>
+            </a:r>
+          </a:p>
+        </p:txBody>
+      </p:sp>
+      <p:cxnSp>
+        <p:nvCxnSpPr>
+          <p:cNvPr id="87" name="Straight Arrow Connector 86"/>
+          <p:cNvCxnSpPr/>
+          <p:nvPr/>
+        </p:nvCxnSpPr>
+        <p:spPr>
+          <a:xfrm flipH="1">
+            <a:off x="4790784" y="1457341"/>
+            <a:ext cx="1363895" cy="0"/>
+          </a:xfrm>
+          <a:prstGeom prst="straightConnector1">
+            <a:avLst/>
+          </a:prstGeom>
+          <a:ln w="38100">
+            <a:tailEnd type="triangle"/>
+          </a:ln>
+        </p:spPr>
+        <p:style>
+          <a:lnRef idx="1">
+            <a:schemeClr val="accent1"/>
+          </a:lnRef>
+          <a:fillRef idx="0">
+            <a:schemeClr val="accent1"/>
+          </a:fillRef>
+          <a:effectRef idx="0">
+            <a:schemeClr val="accent1"/>
+          </a:effectRef>
+          <a:fontRef idx="minor">
+            <a:schemeClr val="tx1"/>
+          </a:fontRef>
+        </p:style>
+      </p:cxnSp>
+      <p:cxnSp>
+        <p:nvCxnSpPr>
+          <p:cNvPr id="90" name="Straight Arrow Connector 89"/>
+          <p:cNvCxnSpPr/>
+          <p:nvPr/>
+        </p:nvCxnSpPr>
+        <p:spPr>
+          <a:xfrm>
+            <a:off x="4460121" y="1781340"/>
+            <a:ext cx="1626531" cy="703763"/>
+          </a:xfrm>
+          <a:prstGeom prst="straightConnector1">
+            <a:avLst/>
+          </a:prstGeom>
+          <a:ln w="38100">
+            <a:tailEnd type="triangle"/>
+          </a:ln>
+        </p:spPr>
+        <p:style>
+          <a:lnRef idx="1">
+            <a:schemeClr val="accent1"/>
+          </a:lnRef>
+          <a:fillRef idx="0">
+            <a:schemeClr val="accent1"/>
+          </a:fillRef>
+          <a:effectRef idx="0">
+            <a:schemeClr val="accent1"/>
+          </a:effectRef>
+          <a:fontRef idx="minor">
+            <a:schemeClr val="tx1"/>
+          </a:fontRef>
+        </p:style>
+      </p:cxnSp>
+      <p:cxnSp>
+        <p:nvCxnSpPr>
+          <p:cNvPr id="93" name="Straight Arrow Connector 92"/>
+          <p:cNvCxnSpPr/>
+          <p:nvPr/>
+        </p:nvCxnSpPr>
+        <p:spPr>
+          <a:xfrm>
+            <a:off x="4780345" y="2775961"/>
+            <a:ext cx="1286459" cy="1529476"/>
+          </a:xfrm>
+          <a:prstGeom prst="straightConnector1">
+            <a:avLst/>
+          </a:prstGeom>
+          <a:ln w="38100">
+            <a:tailEnd type="triangle"/>
+          </a:ln>
+        </p:spPr>
+        <p:style>
+          <a:lnRef idx="1">
+            <a:schemeClr val="accent1"/>
+          </a:lnRef>
+          <a:fillRef idx="0">
+            <a:schemeClr val="accent1"/>
+          </a:fillRef>
+          <a:effectRef idx="0">
+            <a:schemeClr val="accent1"/>
+          </a:effectRef>
+          <a:fontRef idx="minor">
+            <a:schemeClr val="tx1"/>
+          </a:fontRef>
+        </p:style>
+      </p:cxnSp>
+      <p:sp>
+        <p:nvSpPr>
+          <p:cNvPr id="98" name="TextBox 97"/>
+          <p:cNvSpPr txBox="1"/>
+          <p:nvPr/>
+        </p:nvSpPr>
+        <p:spPr>
+          <a:xfrm>
+            <a:off x="2214091" y="5980317"/>
+            <a:ext cx="512102" cy="220341"/>
+          </a:xfrm>
+          <a:prstGeom prst="rect">
+            <a:avLst/>
+          </a:prstGeom>
+          <a:noFill/>
+        </p:spPr>
+        <p:txBody>
+          <a:bodyPr wrap="square" lIns="0" tIns="0" rIns="0" bIns="0" rtlCol="0" anchor="ctr">
+            <a:noAutofit/>
+          </a:bodyPr>
+          <a:lstStyle>
+            <a:defPPr>
+              <a:defRPr lang="en-US"/>
+            </a:defPPr>
+            <a:lvl1pPr algn="ctr">
+              <a:defRPr sz="1100">
+                <a:solidFill>
+                  <a:schemeClr val="tx1">
+                    <a:lumMod val="95000"/>
+                  </a:schemeClr>
+                </a:solidFill>
+                <a:latin typeface="Amazon Ember"/>
+                <a:ea typeface="Amazon Ember Light" charset="0"/>
+                <a:cs typeface="Amazon Ember Light" charset="0"/>
+              </a:defRPr>
+            </a:lvl1pPr>
+          </a:lstStyle>
+          <a:p>
+            <a:r>
               <a:rPr lang="en-US" dirty="0"/>
               <a:t>SNS</a:t>
             </a:r>
@@ -4496,7 +5825,7 @@
           <p:nvPr/>
         </p:nvPicPr>
         <p:blipFill>
-          <a:blip r:embed="rId11">
+          <a:blip r:embed="rId10">
             <a:extLst>
               <a:ext uri="{28A0092B-C50C-407E-A947-70E740481C1C}">
                 <a14:useLocalDpi xmlns:a14="http://schemas.microsoft.com/office/drawing/2010/main" val="0"/>
@@ -4606,7 +5935,7 @@
           <p:nvPr/>
         </p:nvPicPr>
         <p:blipFill>
-          <a:blip r:embed="rId12">
+          <a:blip r:embed="rId11">
             <a:extLst>
               <a:ext uri="{28A0092B-C50C-407E-A947-70E740481C1C}">
                 <a14:useLocalDpi xmlns:a14="http://schemas.microsoft.com/office/drawing/2010/main" val="0"/>
@@ -4671,7 +6000,7 @@
           <p:nvPr/>
         </p:nvPicPr>
         <p:blipFill>
-          <a:blip r:embed="rId13">
+          <a:blip r:embed="rId12">
             <a:extLst>
               <a:ext uri="{28A0092B-C50C-407E-A947-70E740481C1C}">
                 <a14:useLocalDpi xmlns:a14="http://schemas.microsoft.com/office/drawing/2010/main" val="0"/>
@@ -6219,6 +7548,156 @@
           </a:p>
         </p:txBody>
       </p:sp>
+      <p:pic>
+        <p:nvPicPr>
+          <p:cNvPr id="63" name="Picture 62"/>
+          <p:cNvPicPr>
+            <a:picLocks noChangeAspect="1"/>
+          </p:cNvPicPr>
+          <p:nvPr/>
+        </p:nvPicPr>
+        <p:blipFill>
+          <a:blip r:embed="rId13">
+            <a:extLst>
+              <a:ext uri="{28A0092B-C50C-407E-A947-70E740481C1C}">
+                <a14:useLocalDpi xmlns:a14="http://schemas.microsoft.com/office/drawing/2010/main" val="0"/>
+              </a:ext>
+            </a:extLst>
+          </a:blip>
+          <a:stretch>
+            <a:fillRect/>
+          </a:stretch>
+        </p:blipFill>
+        <p:spPr>
+          <a:xfrm>
+            <a:off x="1690476" y="2358407"/>
+            <a:ext cx="479724" cy="498537"/>
+          </a:xfrm>
+          <a:prstGeom prst="rect">
+            <a:avLst/>
+          </a:prstGeom>
+        </p:spPr>
+      </p:pic>
+      <p:pic>
+        <p:nvPicPr>
+          <p:cNvPr id="64" name="Picture 63"/>
+          <p:cNvPicPr>
+            <a:picLocks noChangeAspect="1"/>
+          </p:cNvPicPr>
+          <p:nvPr/>
+        </p:nvPicPr>
+        <p:blipFill>
+          <a:blip r:embed="rId13">
+            <a:extLst>
+              <a:ext uri="{28A0092B-C50C-407E-A947-70E740481C1C}">
+                <a14:useLocalDpi xmlns:a14="http://schemas.microsoft.com/office/drawing/2010/main" val="0"/>
+              </a:ext>
+            </a:extLst>
+          </a:blip>
+          <a:stretch>
+            <a:fillRect/>
+          </a:stretch>
+        </p:blipFill>
+        <p:spPr>
+          <a:xfrm>
+            <a:off x="1597326" y="1149207"/>
+            <a:ext cx="270792" cy="281411"/>
+          </a:xfrm>
+          <a:prstGeom prst="rect">
+            <a:avLst/>
+          </a:prstGeom>
+        </p:spPr>
+      </p:pic>
+      <p:pic>
+        <p:nvPicPr>
+          <p:cNvPr id="66" name="Picture 65"/>
+          <p:cNvPicPr>
+            <a:picLocks noChangeAspect="1"/>
+          </p:cNvPicPr>
+          <p:nvPr/>
+        </p:nvPicPr>
+        <p:blipFill>
+          <a:blip r:embed="rId13">
+            <a:extLst>
+              <a:ext uri="{28A0092B-C50C-407E-A947-70E740481C1C}">
+                <a14:useLocalDpi xmlns:a14="http://schemas.microsoft.com/office/drawing/2010/main" val="0"/>
+              </a:ext>
+            </a:extLst>
+          </a:blip>
+          <a:stretch>
+            <a:fillRect/>
+          </a:stretch>
+        </p:blipFill>
+        <p:spPr>
+          <a:xfrm>
+            <a:off x="1937930" y="1149208"/>
+            <a:ext cx="270792" cy="281411"/>
+          </a:xfrm>
+          <a:prstGeom prst="rect">
+            <a:avLst/>
+          </a:prstGeom>
+        </p:spPr>
+      </p:pic>
+      <p:pic>
+        <p:nvPicPr>
+          <p:cNvPr id="68" name="Picture 67"/>
+          <p:cNvPicPr>
+            <a:picLocks noChangeAspect="1"/>
+          </p:cNvPicPr>
+          <p:nvPr/>
+        </p:nvPicPr>
+        <p:blipFill>
+          <a:blip r:embed="rId13">
+            <a:extLst>
+              <a:ext uri="{28A0092B-C50C-407E-A947-70E740481C1C}">
+                <a14:useLocalDpi xmlns:a14="http://schemas.microsoft.com/office/drawing/2010/main" val="0"/>
+              </a:ext>
+            </a:extLst>
+          </a:blip>
+          <a:stretch>
+            <a:fillRect/>
+          </a:stretch>
+        </p:blipFill>
+        <p:spPr>
+          <a:xfrm>
+            <a:off x="1597326" y="1486382"/>
+            <a:ext cx="270792" cy="281411"/>
+          </a:xfrm>
+          <a:prstGeom prst="rect">
+            <a:avLst/>
+          </a:prstGeom>
+        </p:spPr>
+      </p:pic>
+      <p:pic>
+        <p:nvPicPr>
+          <p:cNvPr id="70" name="Picture 69"/>
+          <p:cNvPicPr>
+            <a:picLocks noChangeAspect="1"/>
+          </p:cNvPicPr>
+          <p:nvPr/>
+        </p:nvPicPr>
+        <p:blipFill>
+          <a:blip r:embed="rId13">
+            <a:extLst>
+              <a:ext uri="{28A0092B-C50C-407E-A947-70E740481C1C}">
+                <a14:useLocalDpi xmlns:a14="http://schemas.microsoft.com/office/drawing/2010/main" val="0"/>
+              </a:ext>
+            </a:extLst>
+          </a:blip>
+          <a:stretch>
+            <a:fillRect/>
+          </a:stretch>
+        </p:blipFill>
+        <p:spPr>
+          <a:xfrm>
+            <a:off x="1936064" y="1486383"/>
+            <a:ext cx="270792" cy="281411"/>
+          </a:xfrm>
+          <a:prstGeom prst="rect">
+            <a:avLst/>
+          </a:prstGeom>
+        </p:spPr>
+      </p:pic>
     </p:spTree>
     <p:extLst>
       <p:ext uri="{BB962C8B-B14F-4D97-AF65-F5344CB8AC3E}">

</xml_diff>